<commit_message>
enough for this day
</commit_message>
<xml_diff>
--- a/MySQL + Hibernate.pptx
+++ b/MySQL + Hibernate.pptx
@@ -12,24 +12,26 @@
     <p:sldId id="268" r:id="rId6"/>
     <p:sldId id="257" r:id="rId7"/>
     <p:sldId id="269" r:id="rId8"/>
-    <p:sldId id="270" r:id="rId9"/>
-    <p:sldId id="272" r:id="rId10"/>
-    <p:sldId id="271" r:id="rId11"/>
-    <p:sldId id="258" r:id="rId12"/>
-    <p:sldId id="278" r:id="rId13"/>
-    <p:sldId id="261" r:id="rId14"/>
-    <p:sldId id="259" r:id="rId15"/>
-    <p:sldId id="265" r:id="rId16"/>
-    <p:sldId id="262" r:id="rId17"/>
-    <p:sldId id="273" r:id="rId18"/>
-    <p:sldId id="274" r:id="rId19"/>
-    <p:sldId id="280" r:id="rId20"/>
-    <p:sldId id="281" r:id="rId21"/>
-    <p:sldId id="282" r:id="rId22"/>
-    <p:sldId id="283" r:id="rId23"/>
-    <p:sldId id="264" r:id="rId24"/>
-    <p:sldId id="275" r:id="rId25"/>
-    <p:sldId id="276" r:id="rId26"/>
+    <p:sldId id="258" r:id="rId9"/>
+    <p:sldId id="278" r:id="rId10"/>
+    <p:sldId id="261" r:id="rId11"/>
+    <p:sldId id="259" r:id="rId12"/>
+    <p:sldId id="265" r:id="rId13"/>
+    <p:sldId id="262" r:id="rId14"/>
+    <p:sldId id="270" r:id="rId15"/>
+    <p:sldId id="271" r:id="rId16"/>
+    <p:sldId id="284" r:id="rId17"/>
+    <p:sldId id="285" r:id="rId18"/>
+    <p:sldId id="286" r:id="rId19"/>
+    <p:sldId id="287" r:id="rId20"/>
+    <p:sldId id="288" r:id="rId21"/>
+    <p:sldId id="289" r:id="rId22"/>
+    <p:sldId id="274" r:id="rId23"/>
+    <p:sldId id="280" r:id="rId24"/>
+    <p:sldId id="281" r:id="rId25"/>
+    <p:sldId id="282" r:id="rId26"/>
+    <p:sldId id="283" r:id="rId27"/>
+    <p:sldId id="276" r:id="rId28"/>
   </p:sldIdLst>
   <p:sldSz cx="9144000" cy="6858000" type="screen4x3"/>
   <p:notesSz cx="6858000" cy="9144000"/>
@@ -3225,357 +3227,6 @@
           <a:p>
             <a:r>
               <a:rPr lang="pl-PL" dirty="0" smtClean="0"/>
-              <a:t>Skąd </a:t>
-            </a:r>
-            <a:r>
-              <a:rPr lang="pl-PL" dirty="0" err="1" smtClean="0"/>
-              <a:t>Hibernate</a:t>
-            </a:r>
-            <a:r>
-              <a:rPr lang="pl-PL" dirty="0" smtClean="0"/>
-              <a:t>?</a:t>
-            </a:r>
-            <a:endParaRPr lang="pl-PL" dirty="0"/>
-          </a:p>
-        </p:txBody>
-      </p:sp>
-      <p:sp>
-        <p:nvSpPr>
-          <p:cNvPr id="3" name="Symbol zastępczy zawartości 2"/>
-          <p:cNvSpPr>
-            <a:spLocks noGrp="1"/>
-          </p:cNvSpPr>
-          <p:nvPr>
-            <p:ph idx="1"/>
-          </p:nvPr>
-        </p:nvSpPr>
-        <p:spPr/>
-        <p:txBody>
-          <a:bodyPr/>
-          <a:lstStyle/>
-          <a:p>
-            <a:pPr marL="0" indent="0">
-              <a:buNone/>
-            </a:pPr>
-            <a:endParaRPr lang="pl-PL" dirty="0"/>
-          </a:p>
-        </p:txBody>
-      </p:sp>
-    </p:spTree>
-    <p:extLst>
-      <p:ext uri="{BB962C8B-B14F-4D97-AF65-F5344CB8AC3E}">
-        <p14:creationId xmlns:p14="http://schemas.microsoft.com/office/powerpoint/2010/main" val="163182516"/>
-      </p:ext>
-    </p:extLst>
-  </p:cSld>
-  <p:clrMapOvr>
-    <a:masterClrMapping/>
-  </p:clrMapOvr>
-</p:sld>
-</file>
-
-<file path=ppt/slides/slide11.xml><?xml version="1.0" encoding="utf-8"?>
-<p:sld xmlns:a="http://schemas.openxmlformats.org/drawingml/2006/main" xmlns:r="http://schemas.openxmlformats.org/officeDocument/2006/relationships" xmlns:p="http://schemas.openxmlformats.org/presentationml/2006/main">
-  <p:cSld>
-    <p:spTree>
-      <p:nvGrpSpPr>
-        <p:cNvPr id="1" name=""/>
-        <p:cNvGrpSpPr/>
-        <p:nvPr/>
-      </p:nvGrpSpPr>
-      <p:grpSpPr>
-        <a:xfrm>
-          <a:off x="0" y="0"/>
-          <a:ext cx="0" cy="0"/>
-          <a:chOff x="0" y="0"/>
-          <a:chExt cx="0" cy="0"/>
-        </a:xfrm>
-      </p:grpSpPr>
-      <p:sp>
-        <p:nvSpPr>
-          <p:cNvPr id="2" name="Tytuł 1"/>
-          <p:cNvSpPr>
-            <a:spLocks noGrp="1"/>
-          </p:cNvSpPr>
-          <p:nvPr>
-            <p:ph type="title"/>
-          </p:nvPr>
-        </p:nvSpPr>
-        <p:spPr/>
-        <p:txBody>
-          <a:bodyPr/>
-          <a:lstStyle/>
-          <a:p>
-            <a:r>
-              <a:rPr lang="pl-PL" dirty="0" smtClean="0"/>
-              <a:t>Uruchomienie – </a:t>
-            </a:r>
-            <a:r>
-              <a:rPr lang="pl-PL" dirty="0" err="1" smtClean="0"/>
-              <a:t>command</a:t>
-            </a:r>
-            <a:r>
-              <a:rPr lang="pl-PL" dirty="0" smtClean="0"/>
-              <a:t> </a:t>
-            </a:r>
-            <a:r>
-              <a:rPr lang="pl-PL" dirty="0" err="1" smtClean="0"/>
-              <a:t>line</a:t>
-            </a:r>
-            <a:endParaRPr lang="pl-PL" dirty="0"/>
-          </a:p>
-        </p:txBody>
-      </p:sp>
-      <p:pic>
-        <p:nvPicPr>
-          <p:cNvPr id="2050" name="Picture 2"/>
-          <p:cNvPicPr>
-            <a:picLocks noChangeAspect="1" noChangeArrowheads="1"/>
-          </p:cNvPicPr>
-          <p:nvPr/>
-        </p:nvPicPr>
-        <p:blipFill>
-          <a:blip r:embed="rId2">
-            <a:extLst>
-              <a:ext uri="{28A0092B-C50C-407E-A947-70E740481C1C}">
-                <a14:useLocalDpi xmlns:a14="http://schemas.microsoft.com/office/drawing/2010/main" val="0"/>
-              </a:ext>
-            </a:extLst>
-          </a:blip>
-          <a:srcRect/>
-          <a:stretch>
-            <a:fillRect/>
-          </a:stretch>
-        </p:blipFill>
-        <p:spPr bwMode="auto">
-          <a:xfrm>
-            <a:off x="-1" y="1700808"/>
-            <a:ext cx="9143933" cy="4617839"/>
-          </a:xfrm>
-          <a:prstGeom prst="rect">
-            <a:avLst/>
-          </a:prstGeom>
-          <a:noFill/>
-          <a:ln>
-            <a:noFill/>
-          </a:ln>
-          <a:effectLst/>
-          <a:extLst>
-            <a:ext uri="{909E8E84-426E-40DD-AFC4-6F175D3DCCD1}">
-              <a14:hiddenFill xmlns:a14="http://schemas.microsoft.com/office/drawing/2010/main">
-                <a:solidFill>
-                  <a:schemeClr val="accent1"/>
-                </a:solidFill>
-              </a14:hiddenFill>
-            </a:ext>
-            <a:ext uri="{91240B29-F687-4F45-9708-019B960494DF}">
-              <a14:hiddenLine xmlns:a14="http://schemas.microsoft.com/office/drawing/2010/main" w="9525">
-                <a:solidFill>
-                  <a:schemeClr val="tx1"/>
-                </a:solidFill>
-                <a:miter lim="800000"/>
-                <a:headEnd/>
-                <a:tailEnd/>
-              </a14:hiddenLine>
-            </a:ext>
-            <a:ext uri="{AF507438-7753-43E0-B8FC-AC1667EBCBE1}">
-              <a14:hiddenEffects xmlns:a14="http://schemas.microsoft.com/office/drawing/2010/main">
-                <a:effectLst>
-                  <a:outerShdw dist="35921" dir="2700000" algn="ctr" rotWithShape="0">
-                    <a:schemeClr val="bg2"/>
-                  </a:outerShdw>
-                </a:effectLst>
-              </a14:hiddenEffects>
-            </a:ext>
-          </a:extLst>
-        </p:spPr>
-      </p:pic>
-    </p:spTree>
-    <p:extLst>
-      <p:ext uri="{BB962C8B-B14F-4D97-AF65-F5344CB8AC3E}">
-        <p14:creationId xmlns:p14="http://schemas.microsoft.com/office/powerpoint/2010/main" val="705834278"/>
-      </p:ext>
-    </p:extLst>
-  </p:cSld>
-  <p:clrMapOvr>
-    <a:masterClrMapping/>
-  </p:clrMapOvr>
-  <p:timing>
-    <p:tnLst>
-      <p:par>
-        <p:cTn id="1" dur="indefinite" restart="never" nodeType="tmRoot"/>
-      </p:par>
-    </p:tnLst>
-  </p:timing>
-</p:sld>
-</file>
-
-<file path=ppt/slides/slide12.xml><?xml version="1.0" encoding="utf-8"?>
-<p:sld xmlns:a="http://schemas.openxmlformats.org/drawingml/2006/main" xmlns:r="http://schemas.openxmlformats.org/officeDocument/2006/relationships" xmlns:p="http://schemas.openxmlformats.org/presentationml/2006/main">
-  <p:cSld>
-    <p:spTree>
-      <p:nvGrpSpPr>
-        <p:cNvPr id="1" name=""/>
-        <p:cNvGrpSpPr/>
-        <p:nvPr/>
-      </p:nvGrpSpPr>
-      <p:grpSpPr>
-        <a:xfrm>
-          <a:off x="0" y="0"/>
-          <a:ext cx="0" cy="0"/>
-          <a:chOff x="0" y="0"/>
-          <a:chExt cx="0" cy="0"/>
-        </a:xfrm>
-      </p:grpSpPr>
-      <p:sp>
-        <p:nvSpPr>
-          <p:cNvPr id="2" name="Tytuł 1"/>
-          <p:cNvSpPr>
-            <a:spLocks noGrp="1"/>
-          </p:cNvSpPr>
-          <p:nvPr>
-            <p:ph type="title"/>
-          </p:nvPr>
-        </p:nvSpPr>
-        <p:spPr/>
-        <p:txBody>
-          <a:bodyPr/>
-          <a:lstStyle/>
-          <a:p>
-            <a:r>
-              <a:rPr lang="pl-PL" dirty="0" smtClean="0"/>
-              <a:t>Uruchomienie - </a:t>
-            </a:r>
-            <a:r>
-              <a:rPr lang="pl-PL" dirty="0"/>
-              <a:t>W</a:t>
-            </a:r>
-            <a:r>
-              <a:rPr lang="pl-PL" dirty="0" smtClean="0"/>
-              <a:t>orkbench</a:t>
-            </a:r>
-            <a:endParaRPr lang="pl-PL" dirty="0"/>
-          </a:p>
-        </p:txBody>
-      </p:sp>
-      <p:pic>
-        <p:nvPicPr>
-          <p:cNvPr id="2051" name="Picture 3"/>
-          <p:cNvPicPr>
-            <a:picLocks noChangeAspect="1" noChangeArrowheads="1"/>
-          </p:cNvPicPr>
-          <p:nvPr/>
-        </p:nvPicPr>
-        <p:blipFill>
-          <a:blip r:embed="rId2">
-            <a:extLst>
-              <a:ext uri="{28A0092B-C50C-407E-A947-70E740481C1C}">
-                <a14:useLocalDpi xmlns:a14="http://schemas.microsoft.com/office/drawing/2010/main" val="0"/>
-              </a:ext>
-            </a:extLst>
-          </a:blip>
-          <a:srcRect/>
-          <a:stretch>
-            <a:fillRect/>
-          </a:stretch>
-        </p:blipFill>
-        <p:spPr bwMode="auto">
-          <a:xfrm>
-            <a:off x="0" y="1413944"/>
-            <a:ext cx="9144000" cy="4924568"/>
-          </a:xfrm>
-          <a:prstGeom prst="rect">
-            <a:avLst/>
-          </a:prstGeom>
-          <a:noFill/>
-          <a:ln>
-            <a:noFill/>
-          </a:ln>
-          <a:effectLst/>
-          <a:extLst>
-            <a:ext uri="{909E8E84-426E-40DD-AFC4-6F175D3DCCD1}">
-              <a14:hiddenFill xmlns:a14="http://schemas.microsoft.com/office/drawing/2010/main">
-                <a:solidFill>
-                  <a:schemeClr val="accent1"/>
-                </a:solidFill>
-              </a14:hiddenFill>
-            </a:ext>
-            <a:ext uri="{91240B29-F687-4F45-9708-019B960494DF}">
-              <a14:hiddenLine xmlns:a14="http://schemas.microsoft.com/office/drawing/2010/main" w="9525">
-                <a:solidFill>
-                  <a:schemeClr val="tx1"/>
-                </a:solidFill>
-                <a:miter lim="800000"/>
-                <a:headEnd/>
-                <a:tailEnd/>
-              </a14:hiddenLine>
-            </a:ext>
-            <a:ext uri="{AF507438-7753-43E0-B8FC-AC1667EBCBE1}">
-              <a14:hiddenEffects xmlns:a14="http://schemas.microsoft.com/office/drawing/2010/main">
-                <a:effectLst>
-                  <a:outerShdw dist="35921" dir="2700000" algn="ctr" rotWithShape="0">
-                    <a:schemeClr val="bg2"/>
-                  </a:outerShdw>
-                </a:effectLst>
-              </a14:hiddenEffects>
-            </a:ext>
-          </a:extLst>
-        </p:spPr>
-      </p:pic>
-    </p:spTree>
-    <p:extLst>
-      <p:ext uri="{BB962C8B-B14F-4D97-AF65-F5344CB8AC3E}">
-        <p14:creationId xmlns:p14="http://schemas.microsoft.com/office/powerpoint/2010/main" val="935810797"/>
-      </p:ext>
-    </p:extLst>
-  </p:cSld>
-  <p:clrMapOvr>
-    <a:masterClrMapping/>
-  </p:clrMapOvr>
-  <p:timing>
-    <p:tnLst>
-      <p:par>
-        <p:cTn id="1" dur="indefinite" restart="never" nodeType="tmRoot"/>
-      </p:par>
-    </p:tnLst>
-  </p:timing>
-</p:sld>
-</file>
-
-<file path=ppt/slides/slide13.xml><?xml version="1.0" encoding="utf-8"?>
-<p:sld xmlns:a="http://schemas.openxmlformats.org/drawingml/2006/main" xmlns:r="http://schemas.openxmlformats.org/officeDocument/2006/relationships" xmlns:p="http://schemas.openxmlformats.org/presentationml/2006/main">
-  <p:cSld>
-    <p:spTree>
-      <p:nvGrpSpPr>
-        <p:cNvPr id="1" name=""/>
-        <p:cNvGrpSpPr/>
-        <p:nvPr/>
-      </p:nvGrpSpPr>
-      <p:grpSpPr>
-        <a:xfrm>
-          <a:off x="0" y="0"/>
-          <a:ext cx="0" cy="0"/>
-          <a:chOff x="0" y="0"/>
-          <a:chExt cx="0" cy="0"/>
-        </a:xfrm>
-      </p:grpSpPr>
-      <p:sp>
-        <p:nvSpPr>
-          <p:cNvPr id="2" name="Tytuł 1"/>
-          <p:cNvSpPr>
-            <a:spLocks noGrp="1"/>
-          </p:cNvSpPr>
-          <p:nvPr>
-            <p:ph type="title"/>
-          </p:nvPr>
-        </p:nvSpPr>
-        <p:spPr/>
-        <p:txBody>
-          <a:bodyPr/>
-          <a:lstStyle/>
-          <a:p>
-            <a:r>
-              <a:rPr lang="pl-PL" dirty="0" smtClean="0"/>
               <a:t>Tworzenie bazy danych</a:t>
             </a:r>
             <a:endParaRPr lang="pl-PL" dirty="0"/>
@@ -4385,7 +4036,7 @@
 </p:sld>
 </file>
 
-<file path=ppt/slides/slide14.xml><?xml version="1.0" encoding="utf-8"?>
+<file path=ppt/slides/slide11.xml><?xml version="1.0" encoding="utf-8"?>
 <p:sld xmlns:a="http://schemas.openxmlformats.org/drawingml/2006/main" xmlns:r="http://schemas.openxmlformats.org/officeDocument/2006/relationships" xmlns:p="http://schemas.openxmlformats.org/presentationml/2006/main">
   <p:cSld>
     <p:spTree>
@@ -4982,7 +4633,7 @@
 </p:sld>
 </file>
 
-<file path=ppt/slides/slide15.xml><?xml version="1.0" encoding="utf-8"?>
+<file path=ppt/slides/slide12.xml><?xml version="1.0" encoding="utf-8"?>
 <p:sld xmlns:a="http://schemas.openxmlformats.org/drawingml/2006/main" xmlns:r="http://schemas.openxmlformats.org/officeDocument/2006/relationships" xmlns:p="http://schemas.openxmlformats.org/presentationml/2006/main">
   <p:cSld>
     <p:spTree>
@@ -5572,7 +5223,7 @@
 </p:sld>
 </file>
 
-<file path=ppt/slides/slide16.xml><?xml version="1.0" encoding="utf-8"?>
+<file path=ppt/slides/slide13.xml><?xml version="1.0" encoding="utf-8"?>
 <p:sld xmlns:a="http://schemas.openxmlformats.org/drawingml/2006/main" xmlns:r="http://schemas.openxmlformats.org/officeDocument/2006/relationships" xmlns:p="http://schemas.openxmlformats.org/presentationml/2006/main">
   <p:cSld>
     <p:spTree>
@@ -6376,6 +6027,421 @@
 </p:sld>
 </file>
 
+<file path=ppt/slides/slide14.xml><?xml version="1.0" encoding="utf-8"?>
+<p:sld xmlns:a="http://schemas.openxmlformats.org/drawingml/2006/main" xmlns:r="http://schemas.openxmlformats.org/officeDocument/2006/relationships" xmlns:p="http://schemas.openxmlformats.org/presentationml/2006/main">
+  <p:cSld>
+    <p:spTree>
+      <p:nvGrpSpPr>
+        <p:cNvPr id="1" name=""/>
+        <p:cNvGrpSpPr/>
+        <p:nvPr/>
+      </p:nvGrpSpPr>
+      <p:grpSpPr>
+        <a:xfrm>
+          <a:off x="0" y="0"/>
+          <a:ext cx="0" cy="0"/>
+          <a:chOff x="0" y="0"/>
+          <a:chExt cx="0" cy="0"/>
+        </a:xfrm>
+      </p:grpSpPr>
+      <p:sp>
+        <p:nvSpPr>
+          <p:cNvPr id="2" name="Tytuł 1"/>
+          <p:cNvSpPr>
+            <a:spLocks noGrp="1"/>
+          </p:cNvSpPr>
+          <p:nvPr>
+            <p:ph type="title"/>
+          </p:nvPr>
+        </p:nvSpPr>
+        <p:spPr/>
+        <p:txBody>
+          <a:bodyPr/>
+          <a:lstStyle/>
+          <a:p>
+            <a:r>
+              <a:rPr lang="pl-PL" dirty="0" smtClean="0"/>
+              <a:t>Wtyczka do </a:t>
+            </a:r>
+            <a:r>
+              <a:rPr lang="pl-PL" dirty="0" err="1" smtClean="0"/>
+              <a:t>Eclipsa</a:t>
+            </a:r>
+            <a:r>
+              <a:rPr lang="pl-PL" dirty="0" smtClean="0"/>
+              <a:t> </a:t>
+            </a:r>
+            <a:endParaRPr lang="pl-PL" dirty="0"/>
+          </a:p>
+        </p:txBody>
+      </p:sp>
+      <p:pic>
+        <p:nvPicPr>
+          <p:cNvPr id="4098" name="Picture 2"/>
+          <p:cNvPicPr>
+            <a:picLocks noChangeAspect="1" noChangeArrowheads="1"/>
+          </p:cNvPicPr>
+          <p:nvPr/>
+        </p:nvPicPr>
+        <p:blipFill>
+          <a:blip r:embed="rId2">
+            <a:extLst>
+              <a:ext uri="{28A0092B-C50C-407E-A947-70E740481C1C}">
+                <a14:useLocalDpi xmlns:a14="http://schemas.microsoft.com/office/drawing/2010/main" val="0"/>
+              </a:ext>
+            </a:extLst>
+          </a:blip>
+          <a:srcRect/>
+          <a:stretch>
+            <a:fillRect/>
+          </a:stretch>
+        </p:blipFill>
+        <p:spPr bwMode="auto">
+          <a:xfrm>
+            <a:off x="1835696" y="1409405"/>
+            <a:ext cx="5230024" cy="4696837"/>
+          </a:xfrm>
+          <a:prstGeom prst="rect">
+            <a:avLst/>
+          </a:prstGeom>
+          <a:noFill/>
+          <a:ln>
+            <a:noFill/>
+          </a:ln>
+          <a:effectLst/>
+          <a:extLst>
+            <a:ext uri="{909E8E84-426E-40DD-AFC4-6F175D3DCCD1}">
+              <a14:hiddenFill xmlns:a14="http://schemas.microsoft.com/office/drawing/2010/main">
+                <a:solidFill>
+                  <a:schemeClr val="accent1"/>
+                </a:solidFill>
+              </a14:hiddenFill>
+            </a:ext>
+            <a:ext uri="{91240B29-F687-4F45-9708-019B960494DF}">
+              <a14:hiddenLine xmlns:a14="http://schemas.microsoft.com/office/drawing/2010/main" w="9525">
+                <a:solidFill>
+                  <a:schemeClr val="tx1"/>
+                </a:solidFill>
+                <a:miter lim="800000"/>
+                <a:headEnd/>
+                <a:tailEnd/>
+              </a14:hiddenLine>
+            </a:ext>
+            <a:ext uri="{AF507438-7753-43E0-B8FC-AC1667EBCBE1}">
+              <a14:hiddenEffects xmlns:a14="http://schemas.microsoft.com/office/drawing/2010/main">
+                <a:effectLst>
+                  <a:outerShdw dist="35921" dir="2700000" algn="ctr" rotWithShape="0">
+                    <a:schemeClr val="bg2"/>
+                  </a:outerShdw>
+                </a:effectLst>
+              </a14:hiddenEffects>
+            </a:ext>
+          </a:extLst>
+        </p:spPr>
+      </p:pic>
+      <p:sp>
+        <p:nvSpPr>
+          <p:cNvPr id="4" name="Prostokąt 3"/>
+          <p:cNvSpPr/>
+          <p:nvPr/>
+        </p:nvSpPr>
+        <p:spPr>
+          <a:xfrm>
+            <a:off x="251520" y="6180166"/>
+            <a:ext cx="6048672" cy="369332"/>
+          </a:xfrm>
+          <a:prstGeom prst="rect">
+            <a:avLst/>
+          </a:prstGeom>
+        </p:spPr>
+        <p:txBody>
+          <a:bodyPr wrap="square">
+            <a:spAutoFit/>
+          </a:bodyPr>
+          <a:lstStyle/>
+          <a:p>
+            <a:r>
+              <a:rPr lang="pl-PL" dirty="0"/>
+              <a:t>http://download.jboss.org/jbosstools/updates/stable/juno/</a:t>
+            </a:r>
+          </a:p>
+        </p:txBody>
+      </p:sp>
+    </p:spTree>
+    <p:extLst>
+      <p:ext uri="{BB962C8B-B14F-4D97-AF65-F5344CB8AC3E}">
+        <p14:creationId xmlns:p14="http://schemas.microsoft.com/office/powerpoint/2010/main" val="4065134659"/>
+      </p:ext>
+    </p:extLst>
+  </p:cSld>
+  <p:clrMapOvr>
+    <a:masterClrMapping/>
+  </p:clrMapOvr>
+</p:sld>
+</file>
+
+<file path=ppt/slides/slide15.xml><?xml version="1.0" encoding="utf-8"?>
+<p:sld xmlns:a="http://schemas.openxmlformats.org/drawingml/2006/main" xmlns:r="http://schemas.openxmlformats.org/officeDocument/2006/relationships" xmlns:p="http://schemas.openxmlformats.org/presentationml/2006/main">
+  <p:cSld>
+    <p:spTree>
+      <p:nvGrpSpPr>
+        <p:cNvPr id="1" name=""/>
+        <p:cNvGrpSpPr/>
+        <p:nvPr/>
+      </p:nvGrpSpPr>
+      <p:grpSpPr>
+        <a:xfrm>
+          <a:off x="0" y="0"/>
+          <a:ext cx="0" cy="0"/>
+          <a:chOff x="0" y="0"/>
+          <a:chExt cx="0" cy="0"/>
+        </a:xfrm>
+      </p:grpSpPr>
+      <p:sp>
+        <p:nvSpPr>
+          <p:cNvPr id="2" name="Tytuł 1"/>
+          <p:cNvSpPr>
+            <a:spLocks noGrp="1"/>
+          </p:cNvSpPr>
+          <p:nvPr>
+            <p:ph type="title"/>
+          </p:nvPr>
+        </p:nvSpPr>
+        <p:spPr/>
+        <p:txBody>
+          <a:bodyPr/>
+          <a:lstStyle/>
+          <a:p>
+            <a:r>
+              <a:rPr lang="pl-PL" dirty="0" smtClean="0"/>
+              <a:t>Nowe połączenie</a:t>
+            </a:r>
+            <a:endParaRPr lang="pl-PL" dirty="0"/>
+          </a:p>
+        </p:txBody>
+      </p:sp>
+      <p:pic>
+        <p:nvPicPr>
+          <p:cNvPr id="5124" name="Picture 4"/>
+          <p:cNvPicPr>
+            <a:picLocks noChangeAspect="1" noChangeArrowheads="1"/>
+          </p:cNvPicPr>
+          <p:nvPr/>
+        </p:nvPicPr>
+        <p:blipFill>
+          <a:blip r:embed="rId2">
+            <a:extLst>
+              <a:ext uri="{28A0092B-C50C-407E-A947-70E740481C1C}">
+                <a14:useLocalDpi xmlns:a14="http://schemas.microsoft.com/office/drawing/2010/main" val="0"/>
+              </a:ext>
+            </a:extLst>
+          </a:blip>
+          <a:srcRect/>
+          <a:stretch>
+            <a:fillRect/>
+          </a:stretch>
+        </p:blipFill>
+        <p:spPr bwMode="auto">
+          <a:xfrm>
+            <a:off x="216551" y="1190650"/>
+            <a:ext cx="8747937" cy="5507647"/>
+          </a:xfrm>
+          <a:prstGeom prst="rect">
+            <a:avLst/>
+          </a:prstGeom>
+          <a:noFill/>
+          <a:ln>
+            <a:noFill/>
+          </a:ln>
+          <a:effectLst/>
+          <a:extLst>
+            <a:ext uri="{909E8E84-426E-40DD-AFC4-6F175D3DCCD1}">
+              <a14:hiddenFill xmlns:a14="http://schemas.microsoft.com/office/drawing/2010/main">
+                <a:solidFill>
+                  <a:schemeClr val="accent1"/>
+                </a:solidFill>
+              </a14:hiddenFill>
+            </a:ext>
+            <a:ext uri="{91240B29-F687-4F45-9708-019B960494DF}">
+              <a14:hiddenLine xmlns:a14="http://schemas.microsoft.com/office/drawing/2010/main" w="9525">
+                <a:solidFill>
+                  <a:schemeClr val="tx1"/>
+                </a:solidFill>
+                <a:miter lim="800000"/>
+                <a:headEnd/>
+                <a:tailEnd/>
+              </a14:hiddenLine>
+            </a:ext>
+            <a:ext uri="{AF507438-7753-43E0-B8FC-AC1667EBCBE1}">
+              <a14:hiddenEffects xmlns:a14="http://schemas.microsoft.com/office/drawing/2010/main">
+                <a:effectLst>
+                  <a:outerShdw dist="35921" dir="2700000" algn="ctr" rotWithShape="0">
+                    <a:schemeClr val="bg2"/>
+                  </a:outerShdw>
+                </a:effectLst>
+              </a14:hiddenEffects>
+            </a:ext>
+          </a:extLst>
+        </p:spPr>
+      </p:pic>
+    </p:spTree>
+    <p:extLst>
+      <p:ext uri="{BB962C8B-B14F-4D97-AF65-F5344CB8AC3E}">
+        <p14:creationId xmlns:p14="http://schemas.microsoft.com/office/powerpoint/2010/main" val="163182516"/>
+      </p:ext>
+    </p:extLst>
+  </p:cSld>
+  <p:clrMapOvr>
+    <a:masterClrMapping/>
+  </p:clrMapOvr>
+</p:sld>
+</file>
+
+<file path=ppt/slides/slide16.xml><?xml version="1.0" encoding="utf-8"?>
+<p:sld xmlns:a="http://schemas.openxmlformats.org/drawingml/2006/main" xmlns:r="http://schemas.openxmlformats.org/officeDocument/2006/relationships" xmlns:p="http://schemas.openxmlformats.org/presentationml/2006/main">
+  <p:cSld>
+    <p:spTree>
+      <p:nvGrpSpPr>
+        <p:cNvPr id="1" name=""/>
+        <p:cNvGrpSpPr/>
+        <p:nvPr/>
+      </p:nvGrpSpPr>
+      <p:grpSpPr>
+        <a:xfrm>
+          <a:off x="0" y="0"/>
+          <a:ext cx="0" cy="0"/>
+          <a:chOff x="0" y="0"/>
+          <a:chExt cx="0" cy="0"/>
+        </a:xfrm>
+      </p:grpSpPr>
+      <p:sp>
+        <p:nvSpPr>
+          <p:cNvPr id="2" name="Tytuł 1"/>
+          <p:cNvSpPr>
+            <a:spLocks noGrp="1"/>
+          </p:cNvSpPr>
+          <p:nvPr>
+            <p:ph type="title"/>
+          </p:nvPr>
+        </p:nvSpPr>
+        <p:spPr/>
+        <p:txBody>
+          <a:bodyPr/>
+          <a:lstStyle/>
+          <a:p>
+            <a:r>
+              <a:rPr lang="pl-PL" dirty="0" smtClean="0"/>
+              <a:t>Sterownik</a:t>
+            </a:r>
+            <a:endParaRPr lang="pl-PL" dirty="0"/>
+          </a:p>
+        </p:txBody>
+      </p:sp>
+      <p:pic>
+        <p:nvPicPr>
+          <p:cNvPr id="7170" name="Picture 2"/>
+          <p:cNvPicPr>
+            <a:picLocks noChangeAspect="1" noChangeArrowheads="1"/>
+          </p:cNvPicPr>
+          <p:nvPr/>
+        </p:nvPicPr>
+        <p:blipFill>
+          <a:blip r:embed="rId2">
+            <a:extLst>
+              <a:ext uri="{28A0092B-C50C-407E-A947-70E740481C1C}">
+                <a14:useLocalDpi xmlns:a14="http://schemas.microsoft.com/office/drawing/2010/main" val="0"/>
+              </a:ext>
+            </a:extLst>
+          </a:blip>
+          <a:srcRect/>
+          <a:stretch>
+            <a:fillRect/>
+          </a:stretch>
+        </p:blipFill>
+        <p:spPr bwMode="auto">
+          <a:xfrm>
+            <a:off x="395536" y="1390373"/>
+            <a:ext cx="8547323" cy="4995286"/>
+          </a:xfrm>
+          <a:prstGeom prst="rect">
+            <a:avLst/>
+          </a:prstGeom>
+          <a:noFill/>
+          <a:ln>
+            <a:noFill/>
+          </a:ln>
+          <a:effectLst/>
+          <a:extLst>
+            <a:ext uri="{909E8E84-426E-40DD-AFC4-6F175D3DCCD1}">
+              <a14:hiddenFill xmlns:a14="http://schemas.microsoft.com/office/drawing/2010/main">
+                <a:solidFill>
+                  <a:schemeClr val="accent1"/>
+                </a:solidFill>
+              </a14:hiddenFill>
+            </a:ext>
+            <a:ext uri="{91240B29-F687-4F45-9708-019B960494DF}">
+              <a14:hiddenLine xmlns:a14="http://schemas.microsoft.com/office/drawing/2010/main" w="9525">
+                <a:solidFill>
+                  <a:schemeClr val="tx1"/>
+                </a:solidFill>
+                <a:miter lim="800000"/>
+                <a:headEnd/>
+                <a:tailEnd/>
+              </a14:hiddenLine>
+            </a:ext>
+            <a:ext uri="{AF507438-7753-43E0-B8FC-AC1667EBCBE1}">
+              <a14:hiddenEffects xmlns:a14="http://schemas.microsoft.com/office/drawing/2010/main">
+                <a:effectLst>
+                  <a:outerShdw dist="35921" dir="2700000" algn="ctr" rotWithShape="0">
+                    <a:schemeClr val="bg2"/>
+                  </a:outerShdw>
+                </a:effectLst>
+              </a14:hiddenEffects>
+            </a:ext>
+          </a:extLst>
+        </p:spPr>
+      </p:pic>
+      <p:sp>
+        <p:nvSpPr>
+          <p:cNvPr id="4" name="Prostokąt 3"/>
+          <p:cNvSpPr/>
+          <p:nvPr/>
+        </p:nvSpPr>
+        <p:spPr>
+          <a:xfrm>
+            <a:off x="4139952" y="6385659"/>
+            <a:ext cx="5004048" cy="369332"/>
+          </a:xfrm>
+          <a:prstGeom prst="rect">
+            <a:avLst/>
+          </a:prstGeom>
+        </p:spPr>
+        <p:txBody>
+          <a:bodyPr wrap="square">
+            <a:spAutoFit/>
+          </a:bodyPr>
+          <a:lstStyle/>
+          <a:p>
+            <a:r>
+              <a:rPr lang="pl-PL" dirty="0"/>
+              <a:t>http://www.mysql.com/downloads/connector/j/</a:t>
+            </a:r>
+          </a:p>
+        </p:txBody>
+      </p:sp>
+    </p:spTree>
+    <p:extLst>
+      <p:ext uri="{BB962C8B-B14F-4D97-AF65-F5344CB8AC3E}">
+        <p14:creationId xmlns:p14="http://schemas.microsoft.com/office/powerpoint/2010/main" val="3985816436"/>
+      </p:ext>
+    </p:extLst>
+  </p:cSld>
+  <p:clrMapOvr>
+    <a:masterClrMapping/>
+  </p:clrMapOvr>
+</p:sld>
+</file>
+
 <file path=ppt/slides/slide17.xml><?xml version="1.0" encoding="utf-8"?>
 <p:sld xmlns:a="http://schemas.openxmlformats.org/drawingml/2006/main" xmlns:r="http://schemas.openxmlformats.org/officeDocument/2006/relationships" xmlns:p="http://schemas.openxmlformats.org/presentationml/2006/main">
   <p:cSld>
@@ -6409,44 +6475,81 @@
           <a:lstStyle/>
           <a:p>
             <a:r>
-              <a:rPr lang="pl-PL" dirty="0" err="1" smtClean="0"/>
-              <a:t>Hibernate</a:t>
-            </a:r>
-            <a:r>
               <a:rPr lang="pl-PL" dirty="0" smtClean="0"/>
-              <a:t> – dostęp do bazy</a:t>
+              <a:t>Ping</a:t>
             </a:r>
             <a:endParaRPr lang="pl-PL" dirty="0"/>
           </a:p>
         </p:txBody>
       </p:sp>
-      <p:sp>
-        <p:nvSpPr>
-          <p:cNvPr id="3" name="Symbol zastępczy zawartości 2"/>
-          <p:cNvSpPr>
-            <a:spLocks noGrp="1"/>
-          </p:cNvSpPr>
-          <p:nvPr>
-            <p:ph idx="1"/>
-          </p:nvPr>
-        </p:nvSpPr>
-        <p:spPr/>
-        <p:txBody>
-          <a:bodyPr/>
-          <a:lstStyle/>
-          <a:p>
-            <a:r>
-              <a:rPr lang="pl-PL" dirty="0" smtClean="0"/>
-              <a:t>Sposób nawiązywania połączenia</a:t>
-            </a:r>
-            <a:endParaRPr lang="pl-PL" dirty="0"/>
-          </a:p>
-        </p:txBody>
-      </p:sp>
+      <p:pic>
+        <p:nvPicPr>
+          <p:cNvPr id="8194" name="Picture 2"/>
+          <p:cNvPicPr>
+            <a:picLocks noChangeAspect="1" noChangeArrowheads="1"/>
+          </p:cNvPicPr>
+          <p:nvPr/>
+        </p:nvPicPr>
+        <p:blipFill>
+          <a:blip r:embed="rId2">
+            <a:extLst>
+              <a:ext uri="{28A0092B-C50C-407E-A947-70E740481C1C}">
+                <a14:useLocalDpi xmlns:a14="http://schemas.microsoft.com/office/drawing/2010/main" val="0"/>
+              </a:ext>
+            </a:extLst>
+          </a:blip>
+          <a:srcRect/>
+          <a:stretch>
+            <a:fillRect/>
+          </a:stretch>
+        </p:blipFill>
+        <p:spPr bwMode="auto">
+          <a:xfrm>
+            <a:off x="827584" y="1139498"/>
+            <a:ext cx="7373068" cy="5451801"/>
+          </a:xfrm>
+          <a:prstGeom prst="rect">
+            <a:avLst/>
+          </a:prstGeom>
+          <a:noFill/>
+          <a:ln>
+            <a:noFill/>
+          </a:ln>
+          <a:effectLst/>
+          <a:extLst>
+            <a:ext uri="{909E8E84-426E-40DD-AFC4-6F175D3DCCD1}">
+              <a14:hiddenFill xmlns:a14="http://schemas.microsoft.com/office/drawing/2010/main">
+                <a:solidFill>
+                  <a:schemeClr val="accent1"/>
+                </a:solidFill>
+              </a14:hiddenFill>
+            </a:ext>
+            <a:ext uri="{91240B29-F687-4F45-9708-019B960494DF}">
+              <a14:hiddenLine xmlns:a14="http://schemas.microsoft.com/office/drawing/2010/main" w="9525">
+                <a:solidFill>
+                  <a:schemeClr val="tx1"/>
+                </a:solidFill>
+                <a:miter lim="800000"/>
+                <a:headEnd/>
+                <a:tailEnd/>
+              </a14:hiddenLine>
+            </a:ext>
+            <a:ext uri="{AF507438-7753-43E0-B8FC-AC1667EBCBE1}">
+              <a14:hiddenEffects xmlns:a14="http://schemas.microsoft.com/office/drawing/2010/main">
+                <a:effectLst>
+                  <a:outerShdw dist="35921" dir="2700000" algn="ctr" rotWithShape="0">
+                    <a:schemeClr val="bg2"/>
+                  </a:outerShdw>
+                </a:effectLst>
+              </a14:hiddenEffects>
+            </a:ext>
+          </a:extLst>
+        </p:spPr>
+      </p:pic>
     </p:spTree>
     <p:extLst>
       <p:ext uri="{BB962C8B-B14F-4D97-AF65-F5344CB8AC3E}">
-        <p14:creationId xmlns:p14="http://schemas.microsoft.com/office/powerpoint/2010/main" val="1573387188"/>
+        <p14:creationId xmlns:p14="http://schemas.microsoft.com/office/powerpoint/2010/main" val="2652503993"/>
       </p:ext>
     </p:extLst>
   </p:cSld>
@@ -6490,445 +6593,80 @@
           <a:p>
             <a:r>
               <a:rPr lang="pl-PL" dirty="0" smtClean="0"/>
-              <a:t>Transakcje</a:t>
+              <a:t>hibernate.cfg.xml</a:t>
             </a:r>
             <a:endParaRPr lang="pl-PL" dirty="0"/>
           </a:p>
         </p:txBody>
       </p:sp>
-      <p:sp>
-        <p:nvSpPr>
-          <p:cNvPr id="4" name="Prostokąt 3"/>
-          <p:cNvSpPr/>
+      <p:pic>
+        <p:nvPicPr>
+          <p:cNvPr id="9218" name="Picture 2"/>
+          <p:cNvPicPr>
+            <a:picLocks noChangeAspect="1" noChangeArrowheads="1"/>
+          </p:cNvPicPr>
           <p:nvPr/>
-        </p:nvSpPr>
-        <p:spPr>
+        </p:nvPicPr>
+        <p:blipFill>
+          <a:blip r:embed="rId2">
+            <a:extLst>
+              <a:ext uri="{28A0092B-C50C-407E-A947-70E740481C1C}">
+                <a14:useLocalDpi xmlns:a14="http://schemas.microsoft.com/office/drawing/2010/main" val="0"/>
+              </a:ext>
+            </a:extLst>
+          </a:blip>
+          <a:srcRect/>
+          <a:stretch>
+            <a:fillRect/>
+          </a:stretch>
+        </p:blipFill>
+        <p:spPr bwMode="auto">
           <a:xfrm>
-            <a:off x="899592" y="1412776"/>
-            <a:ext cx="7416824" cy="5078313"/>
+            <a:off x="0" y="1285255"/>
+            <a:ext cx="9144000" cy="5193678"/>
           </a:xfrm>
           <a:prstGeom prst="rect">
             <a:avLst/>
           </a:prstGeom>
+          <a:noFill/>
+          <a:ln>
+            <a:noFill/>
+          </a:ln>
+          <a:effectLst/>
+          <a:extLst>
+            <a:ext uri="{909E8E84-426E-40DD-AFC4-6F175D3DCCD1}">
+              <a14:hiddenFill xmlns:a14="http://schemas.microsoft.com/office/drawing/2010/main">
+                <a:solidFill>
+                  <a:schemeClr val="accent1"/>
+                </a:solidFill>
+              </a14:hiddenFill>
+            </a:ext>
+            <a:ext uri="{91240B29-F687-4F45-9708-019B960494DF}">
+              <a14:hiddenLine xmlns:a14="http://schemas.microsoft.com/office/drawing/2010/main" w="9525">
+                <a:solidFill>
+                  <a:schemeClr val="tx1"/>
+                </a:solidFill>
+                <a:miter lim="800000"/>
+                <a:headEnd/>
+                <a:tailEnd/>
+              </a14:hiddenLine>
+            </a:ext>
+            <a:ext uri="{AF507438-7753-43E0-B8FC-AC1667EBCBE1}">
+              <a14:hiddenEffects xmlns:a14="http://schemas.microsoft.com/office/drawing/2010/main">
+                <a:effectLst>
+                  <a:outerShdw dist="35921" dir="2700000" algn="ctr" rotWithShape="0">
+                    <a:schemeClr val="bg2"/>
+                  </a:outerShdw>
+                </a:effectLst>
+              </a14:hiddenEffects>
+            </a:ext>
+          </a:extLst>
         </p:spPr>
-        <p:txBody>
-          <a:bodyPr wrap="square">
-            <a:spAutoFit/>
-          </a:bodyPr>
-          <a:lstStyle/>
-          <a:p>
-            <a:r>
-              <a:rPr lang="pl-PL" dirty="0" err="1">
-                <a:latin typeface="Lucida Console" pitchFamily="49" charset="0"/>
-              </a:rPr>
-              <a:t>Transaction</a:t>
-            </a:r>
-            <a:r>
-              <a:rPr lang="pl-PL" dirty="0">
-                <a:latin typeface="Lucida Console" pitchFamily="49" charset="0"/>
-              </a:rPr>
-              <a:t> </a:t>
-            </a:r>
-            <a:r>
-              <a:rPr lang="pl-PL" dirty="0" err="1">
-                <a:latin typeface="Lucida Console" pitchFamily="49" charset="0"/>
-              </a:rPr>
-              <a:t>trns</a:t>
-            </a:r>
-            <a:r>
-              <a:rPr lang="pl-PL" dirty="0">
-                <a:latin typeface="Lucida Console" pitchFamily="49" charset="0"/>
-              </a:rPr>
-              <a:t> = </a:t>
-            </a:r>
-            <a:r>
-              <a:rPr lang="pl-PL" dirty="0" err="1">
-                <a:latin typeface="Lucida Console" pitchFamily="49" charset="0"/>
-              </a:rPr>
-              <a:t>null</a:t>
-            </a:r>
-            <a:r>
-              <a:rPr lang="pl-PL" dirty="0">
-                <a:latin typeface="Lucida Console" pitchFamily="49" charset="0"/>
-              </a:rPr>
-              <a:t>;</a:t>
-            </a:r>
-          </a:p>
-          <a:p>
-            <a:r>
-              <a:rPr lang="pl-PL" dirty="0" err="1">
-                <a:latin typeface="Lucida Console" pitchFamily="49" charset="0"/>
-              </a:rPr>
-              <a:t>Session</a:t>
-            </a:r>
-            <a:r>
-              <a:rPr lang="pl-PL" dirty="0">
-                <a:latin typeface="Lucida Console" pitchFamily="49" charset="0"/>
-              </a:rPr>
-              <a:t> </a:t>
-            </a:r>
-            <a:r>
-              <a:rPr lang="pl-PL" dirty="0" err="1">
-                <a:latin typeface="Lucida Console" pitchFamily="49" charset="0"/>
-              </a:rPr>
-              <a:t>session</a:t>
-            </a:r>
-            <a:r>
-              <a:rPr lang="pl-PL" dirty="0">
-                <a:latin typeface="Lucida Console" pitchFamily="49" charset="0"/>
-              </a:rPr>
-              <a:t> = </a:t>
-            </a:r>
-            <a:r>
-              <a:rPr lang="pl-PL" dirty="0" err="1">
-                <a:latin typeface="Lucida Console" pitchFamily="49" charset="0"/>
-              </a:rPr>
-              <a:t>HibernateUtil.</a:t>
-            </a:r>
-            <a:r>
-              <a:rPr lang="pl-PL" i="1" dirty="0" err="1">
-                <a:latin typeface="Lucida Console" pitchFamily="49" charset="0"/>
-              </a:rPr>
-              <a:t>getSessionFactory</a:t>
-            </a:r>
-            <a:r>
-              <a:rPr lang="pl-PL" i="1" dirty="0">
-                <a:latin typeface="Lucida Console" pitchFamily="49" charset="0"/>
-              </a:rPr>
-              <a:t>().</a:t>
-            </a:r>
-            <a:r>
-              <a:rPr lang="pl-PL" i="1" dirty="0" err="1">
-                <a:latin typeface="Lucida Console" pitchFamily="49" charset="0"/>
-              </a:rPr>
-              <a:t>openSession</a:t>
-            </a:r>
-            <a:r>
-              <a:rPr lang="pl-PL" i="1" dirty="0" smtClean="0">
-                <a:latin typeface="Lucida Console" pitchFamily="49" charset="0"/>
-              </a:rPr>
-              <a:t>();</a:t>
-            </a:r>
-          </a:p>
-          <a:p>
-            <a:endParaRPr lang="pl-PL" i="1" dirty="0">
-              <a:latin typeface="Lucida Console" pitchFamily="49" charset="0"/>
-            </a:endParaRPr>
-          </a:p>
-          <a:p>
-            <a:r>
-              <a:rPr lang="pl-PL" dirty="0" err="1">
-                <a:latin typeface="Lucida Console" pitchFamily="49" charset="0"/>
-              </a:rPr>
-              <a:t>try</a:t>
-            </a:r>
-            <a:r>
-              <a:rPr lang="pl-PL" dirty="0">
-                <a:latin typeface="Lucida Console" pitchFamily="49" charset="0"/>
-              </a:rPr>
-              <a:t> {</a:t>
-            </a:r>
-          </a:p>
-          <a:p>
-            <a:r>
-              <a:rPr lang="pl-PL" dirty="0" smtClean="0">
-                <a:latin typeface="Lucida Console" pitchFamily="49" charset="0"/>
-              </a:rPr>
-              <a:t>	</a:t>
-            </a:r>
-            <a:r>
-              <a:rPr lang="pl-PL" dirty="0" err="1" smtClean="0">
-                <a:latin typeface="Lucida Console" pitchFamily="49" charset="0"/>
-              </a:rPr>
-              <a:t>trns</a:t>
-            </a:r>
-            <a:r>
-              <a:rPr lang="pl-PL" dirty="0" smtClean="0">
-                <a:latin typeface="Lucida Console" pitchFamily="49" charset="0"/>
-              </a:rPr>
-              <a:t> </a:t>
-            </a:r>
-            <a:r>
-              <a:rPr lang="pl-PL" dirty="0">
-                <a:latin typeface="Lucida Console" pitchFamily="49" charset="0"/>
-              </a:rPr>
-              <a:t>= </a:t>
-            </a:r>
-            <a:r>
-              <a:rPr lang="pl-PL" dirty="0" err="1">
-                <a:latin typeface="Lucida Console" pitchFamily="49" charset="0"/>
-              </a:rPr>
-              <a:t>session.beginTransaction</a:t>
-            </a:r>
-            <a:r>
-              <a:rPr lang="pl-PL" dirty="0">
-                <a:latin typeface="Lucida Console" pitchFamily="49" charset="0"/>
-              </a:rPr>
-              <a:t>();</a:t>
-            </a:r>
-          </a:p>
-          <a:p>
-            <a:r>
-              <a:rPr lang="pl-PL" dirty="0">
-                <a:latin typeface="Lucida Console" pitchFamily="49" charset="0"/>
-              </a:rPr>
-              <a:t>	</a:t>
-            </a:r>
-            <a:r>
-              <a:rPr lang="pl-PL" dirty="0" smtClean="0">
-                <a:latin typeface="Lucida Console" pitchFamily="49" charset="0"/>
-              </a:rPr>
-              <a:t>//...</a:t>
-            </a:r>
-            <a:endParaRPr lang="pl-PL" dirty="0">
-              <a:latin typeface="Lucida Console" pitchFamily="49" charset="0"/>
-            </a:endParaRPr>
-          </a:p>
-          <a:p>
-            <a:r>
-              <a:rPr lang="pl-PL" dirty="0" smtClean="0">
-                <a:latin typeface="Lucida Console" pitchFamily="49" charset="0"/>
-              </a:rPr>
-              <a:t>	</a:t>
-            </a:r>
-            <a:r>
-              <a:rPr lang="pl-PL" dirty="0" err="1" smtClean="0">
-                <a:latin typeface="Lucida Console" pitchFamily="49" charset="0"/>
-              </a:rPr>
-              <a:t>session.getTransaction</a:t>
-            </a:r>
-            <a:r>
-              <a:rPr lang="pl-PL" dirty="0">
-                <a:latin typeface="Lucida Console" pitchFamily="49" charset="0"/>
-              </a:rPr>
-              <a:t>().</a:t>
-            </a:r>
-            <a:r>
-              <a:rPr lang="pl-PL" dirty="0" err="1">
-                <a:latin typeface="Lucida Console" pitchFamily="49" charset="0"/>
-              </a:rPr>
-              <a:t>commit</a:t>
-            </a:r>
-            <a:r>
-              <a:rPr lang="pl-PL" dirty="0" smtClean="0">
-                <a:latin typeface="Lucida Console" pitchFamily="49" charset="0"/>
-              </a:rPr>
-              <a:t>();</a:t>
-            </a:r>
-          </a:p>
-          <a:p>
-            <a:endParaRPr lang="pl-PL" dirty="0">
-              <a:latin typeface="Lucida Console" pitchFamily="49" charset="0"/>
-            </a:endParaRPr>
-          </a:p>
-          <a:p>
-            <a:r>
-              <a:rPr lang="pl-PL" dirty="0">
-                <a:latin typeface="Lucida Console" pitchFamily="49" charset="0"/>
-              </a:rPr>
-              <a:t>} </a:t>
-            </a:r>
-            <a:r>
-              <a:rPr lang="pl-PL" dirty="0" err="1">
-                <a:latin typeface="Lucida Console" pitchFamily="49" charset="0"/>
-              </a:rPr>
-              <a:t>catch</a:t>
-            </a:r>
-            <a:r>
-              <a:rPr lang="pl-PL" dirty="0">
-                <a:latin typeface="Lucida Console" pitchFamily="49" charset="0"/>
-              </a:rPr>
-              <a:t> (</a:t>
-            </a:r>
-            <a:r>
-              <a:rPr lang="pl-PL" dirty="0" err="1">
-                <a:latin typeface="Lucida Console" pitchFamily="49" charset="0"/>
-              </a:rPr>
-              <a:t>RuntimeException</a:t>
-            </a:r>
-            <a:r>
-              <a:rPr lang="pl-PL" dirty="0">
-                <a:latin typeface="Lucida Console" pitchFamily="49" charset="0"/>
-              </a:rPr>
-              <a:t> e) {</a:t>
-            </a:r>
-          </a:p>
-          <a:p>
-            <a:r>
-              <a:rPr lang="pl-PL" dirty="0" smtClean="0">
-                <a:latin typeface="Lucida Console" pitchFamily="49" charset="0"/>
-              </a:rPr>
-              <a:t>	</a:t>
-            </a:r>
-            <a:r>
-              <a:rPr lang="pl-PL" dirty="0" err="1" smtClean="0">
-                <a:latin typeface="Lucida Console" pitchFamily="49" charset="0"/>
-              </a:rPr>
-              <a:t>if</a:t>
-            </a:r>
-            <a:r>
-              <a:rPr lang="pl-PL" dirty="0" smtClean="0">
-                <a:latin typeface="Lucida Console" pitchFamily="49" charset="0"/>
-              </a:rPr>
-              <a:t> </a:t>
-            </a:r>
-            <a:r>
-              <a:rPr lang="pl-PL" dirty="0">
-                <a:latin typeface="Lucida Console" pitchFamily="49" charset="0"/>
-              </a:rPr>
-              <a:t>(</a:t>
-            </a:r>
-            <a:r>
-              <a:rPr lang="pl-PL" dirty="0" err="1">
-                <a:latin typeface="Lucida Console" pitchFamily="49" charset="0"/>
-              </a:rPr>
-              <a:t>trns</a:t>
-            </a:r>
-            <a:r>
-              <a:rPr lang="pl-PL" dirty="0">
-                <a:latin typeface="Lucida Console" pitchFamily="49" charset="0"/>
-              </a:rPr>
-              <a:t> != </a:t>
-            </a:r>
-            <a:r>
-              <a:rPr lang="pl-PL" dirty="0" err="1">
-                <a:latin typeface="Lucida Console" pitchFamily="49" charset="0"/>
-              </a:rPr>
-              <a:t>null</a:t>
-            </a:r>
-            <a:r>
-              <a:rPr lang="pl-PL" dirty="0">
-                <a:latin typeface="Lucida Console" pitchFamily="49" charset="0"/>
-              </a:rPr>
-              <a:t>) </a:t>
-            </a:r>
-          </a:p>
-          <a:p>
-            <a:r>
-              <a:rPr lang="pl-PL" dirty="0" smtClean="0">
-                <a:latin typeface="Lucida Console" pitchFamily="49" charset="0"/>
-              </a:rPr>
-              <a:t>		</a:t>
-            </a:r>
-            <a:r>
-              <a:rPr lang="pl-PL" dirty="0" err="1" smtClean="0">
-                <a:latin typeface="Lucida Console" pitchFamily="49" charset="0"/>
-              </a:rPr>
-              <a:t>trns.rollback</a:t>
-            </a:r>
-            <a:r>
-              <a:rPr lang="pl-PL" dirty="0">
-                <a:latin typeface="Lucida Console" pitchFamily="49" charset="0"/>
-              </a:rPr>
-              <a:t>();</a:t>
-            </a:r>
-          </a:p>
-          <a:p>
-            <a:pPr lvl="1"/>
-            <a:r>
-              <a:rPr lang="pl-PL" dirty="0" smtClean="0">
-                <a:latin typeface="Lucida Console" pitchFamily="49" charset="0"/>
-              </a:rPr>
-              <a:t>	</a:t>
-            </a:r>
-            <a:r>
-              <a:rPr lang="pl-PL" dirty="0" err="1" smtClean="0">
-                <a:latin typeface="Lucida Console" pitchFamily="49" charset="0"/>
-              </a:rPr>
-              <a:t>e.printStackTrace</a:t>
-            </a:r>
-            <a:r>
-              <a:rPr lang="pl-PL" dirty="0" smtClean="0">
-                <a:latin typeface="Lucida Console" pitchFamily="49" charset="0"/>
-              </a:rPr>
-              <a:t>();</a:t>
-            </a:r>
-          </a:p>
-          <a:p>
-            <a:pPr lvl="1"/>
-            <a:endParaRPr lang="pl-PL" dirty="0">
-              <a:latin typeface="Lucida Console" pitchFamily="49" charset="0"/>
-            </a:endParaRPr>
-          </a:p>
-          <a:p>
-            <a:r>
-              <a:rPr lang="pl-PL" dirty="0">
-                <a:latin typeface="Lucida Console" pitchFamily="49" charset="0"/>
-              </a:rPr>
-              <a:t>} </a:t>
-            </a:r>
-            <a:r>
-              <a:rPr lang="pl-PL" dirty="0" err="1">
-                <a:latin typeface="Lucida Console" pitchFamily="49" charset="0"/>
-              </a:rPr>
-              <a:t>finally</a:t>
-            </a:r>
-            <a:r>
-              <a:rPr lang="pl-PL" dirty="0">
-                <a:latin typeface="Lucida Console" pitchFamily="49" charset="0"/>
-              </a:rPr>
-              <a:t> {</a:t>
-            </a:r>
-          </a:p>
-          <a:p>
-            <a:pPr lvl="1"/>
-            <a:r>
-              <a:rPr lang="pl-PL" dirty="0" smtClean="0">
-                <a:latin typeface="Lucida Console" pitchFamily="49" charset="0"/>
-              </a:rPr>
-              <a:t>	</a:t>
-            </a:r>
-            <a:r>
-              <a:rPr lang="pl-PL" dirty="0" err="1" smtClean="0">
-                <a:latin typeface="Lucida Console" pitchFamily="49" charset="0"/>
-              </a:rPr>
-              <a:t>session.flush</a:t>
-            </a:r>
-            <a:r>
-              <a:rPr lang="pl-PL" dirty="0">
-                <a:latin typeface="Lucida Console" pitchFamily="49" charset="0"/>
-              </a:rPr>
-              <a:t>();</a:t>
-            </a:r>
-          </a:p>
-          <a:p>
-            <a:pPr lvl="1"/>
-            <a:r>
-              <a:rPr lang="pl-PL" dirty="0" smtClean="0">
-                <a:latin typeface="Lucida Console" pitchFamily="49" charset="0"/>
-              </a:rPr>
-              <a:t>	</a:t>
-            </a:r>
-            <a:r>
-              <a:rPr lang="pl-PL" dirty="0" err="1" smtClean="0">
-                <a:latin typeface="Lucida Console" pitchFamily="49" charset="0"/>
-              </a:rPr>
-              <a:t>session.close</a:t>
-            </a:r>
-            <a:r>
-              <a:rPr lang="pl-PL" dirty="0">
-                <a:latin typeface="Lucida Console" pitchFamily="49" charset="0"/>
-              </a:rPr>
-              <a:t>();</a:t>
-            </a:r>
-          </a:p>
-          <a:p>
-            <a:r>
-              <a:rPr lang="pl-PL" dirty="0">
-                <a:latin typeface="Lucida Console" pitchFamily="49" charset="0"/>
-              </a:rPr>
-              <a:t>}</a:t>
-            </a:r>
-            <a:endParaRPr lang="pl-PL" dirty="0">
-              <a:latin typeface="Lucida Console" pitchFamily="49" charset="0"/>
-            </a:endParaRPr>
-          </a:p>
-        </p:txBody>
-      </p:sp>
+      </p:pic>
     </p:spTree>
     <p:extLst>
       <p:ext uri="{BB962C8B-B14F-4D97-AF65-F5344CB8AC3E}">
-        <p14:creationId xmlns:p14="http://schemas.microsoft.com/office/powerpoint/2010/main" val="1573387188"/>
+        <p14:creationId xmlns:p14="http://schemas.microsoft.com/office/powerpoint/2010/main" val="2374854766"/>
       </p:ext>
     </p:extLst>
   </p:cSld>
@@ -6971,158 +6709,89 @@
           <a:lstStyle/>
           <a:p>
             <a:r>
+              <a:rPr lang="pl-PL" dirty="0" smtClean="0"/>
+              <a:t>POJO + </a:t>
+            </a:r>
+            <a:r>
               <a:rPr lang="pl-PL" dirty="0" err="1" smtClean="0"/>
-              <a:t>Create</a:t>
+              <a:t>mapping</a:t>
             </a:r>
             <a:r>
               <a:rPr lang="pl-PL" dirty="0" smtClean="0"/>
-              <a:t>…</a:t>
+              <a:t> file</a:t>
             </a:r>
             <a:endParaRPr lang="pl-PL" dirty="0"/>
           </a:p>
         </p:txBody>
       </p:sp>
-      <p:sp>
-        <p:nvSpPr>
-          <p:cNvPr id="4" name="Prostokąt 3"/>
-          <p:cNvSpPr/>
+      <p:pic>
+        <p:nvPicPr>
+          <p:cNvPr id="10243" name="Picture 3"/>
+          <p:cNvPicPr>
+            <a:picLocks noChangeAspect="1" noChangeArrowheads="1"/>
+          </p:cNvPicPr>
           <p:nvPr/>
-        </p:nvSpPr>
-        <p:spPr>
+        </p:nvPicPr>
+        <p:blipFill>
+          <a:blip r:embed="rId2">
+            <a:extLst>
+              <a:ext uri="{28A0092B-C50C-407E-A947-70E740481C1C}">
+                <a14:useLocalDpi xmlns:a14="http://schemas.microsoft.com/office/drawing/2010/main" val="0"/>
+              </a:ext>
+            </a:extLst>
+          </a:blip>
+          <a:srcRect/>
+          <a:stretch>
+            <a:fillRect/>
+          </a:stretch>
+        </p:blipFill>
+        <p:spPr bwMode="auto">
           <a:xfrm>
-            <a:off x="323528" y="2001029"/>
-            <a:ext cx="8820472" cy="2308324"/>
+            <a:off x="323528" y="1195632"/>
+            <a:ext cx="8604448" cy="5643777"/>
           </a:xfrm>
           <a:prstGeom prst="rect">
             <a:avLst/>
           </a:prstGeom>
+          <a:noFill/>
+          <a:ln>
+            <a:noFill/>
+          </a:ln>
+          <a:effectLst/>
+          <a:extLst>
+            <a:ext uri="{909E8E84-426E-40DD-AFC4-6F175D3DCCD1}">
+              <a14:hiddenFill xmlns:a14="http://schemas.microsoft.com/office/drawing/2010/main">
+                <a:solidFill>
+                  <a:schemeClr val="accent1"/>
+                </a:solidFill>
+              </a14:hiddenFill>
+            </a:ext>
+            <a:ext uri="{91240B29-F687-4F45-9708-019B960494DF}">
+              <a14:hiddenLine xmlns:a14="http://schemas.microsoft.com/office/drawing/2010/main" w="9525">
+                <a:solidFill>
+                  <a:schemeClr val="tx1"/>
+                </a:solidFill>
+                <a:miter lim="800000"/>
+                <a:headEnd/>
+                <a:tailEnd/>
+              </a14:hiddenLine>
+            </a:ext>
+            <a:ext uri="{AF507438-7753-43E0-B8FC-AC1667EBCBE1}">
+              <a14:hiddenEffects xmlns:a14="http://schemas.microsoft.com/office/drawing/2010/main">
+                <a:effectLst>
+                  <a:outerShdw dist="35921" dir="2700000" algn="ctr" rotWithShape="0">
+                    <a:schemeClr val="bg2"/>
+                  </a:outerShdw>
+                </a:effectLst>
+              </a14:hiddenEffects>
+            </a:ext>
+          </a:extLst>
         </p:spPr>
-        <p:txBody>
-          <a:bodyPr wrap="square">
-            <a:spAutoFit/>
-          </a:bodyPr>
-          <a:lstStyle/>
-          <a:p>
-            <a:r>
-              <a:rPr lang="en-US" dirty="0">
-                <a:latin typeface="Lucida Console" pitchFamily="49" charset="0"/>
-              </a:rPr>
-              <a:t>Customer c = new Customer("AXAMI", "</a:t>
-            </a:r>
-            <a:r>
-              <a:rPr lang="en-US" dirty="0" err="1">
-                <a:latin typeface="Lucida Console" pitchFamily="49" charset="0"/>
-              </a:rPr>
-              <a:t>Aksamit</a:t>
-            </a:r>
-            <a:r>
-              <a:rPr lang="en-US" dirty="0">
-                <a:latin typeface="Lucida Console" pitchFamily="49" charset="0"/>
-              </a:rPr>
-              <a:t> INC.");</a:t>
-            </a:r>
-          </a:p>
-          <a:p>
-            <a:r>
-              <a:rPr lang="pl-PL" dirty="0" err="1">
-                <a:latin typeface="Lucida Console" pitchFamily="49" charset="0"/>
-              </a:rPr>
-              <a:t>session.save</a:t>
-            </a:r>
-            <a:r>
-              <a:rPr lang="pl-PL" dirty="0">
-                <a:latin typeface="Lucida Console" pitchFamily="49" charset="0"/>
-              </a:rPr>
-              <a:t>(c);</a:t>
-            </a:r>
-          </a:p>
-          <a:p>
-            <a:endParaRPr lang="pl-PL" dirty="0">
-              <a:latin typeface="Lucida Console" pitchFamily="49" charset="0"/>
-            </a:endParaRPr>
-          </a:p>
-          <a:p>
-            <a:r>
-              <a:rPr lang="en-US" dirty="0">
-                <a:latin typeface="Lucida Console" pitchFamily="49" charset="0"/>
-              </a:rPr>
-              <a:t>Employee e = new Employee("</a:t>
-            </a:r>
-            <a:r>
-              <a:rPr lang="en-US" dirty="0" err="1">
-                <a:latin typeface="Lucida Console" pitchFamily="49" charset="0"/>
-              </a:rPr>
-              <a:t>Alicja</a:t>
-            </a:r>
-            <a:r>
-              <a:rPr lang="en-US" dirty="0">
-                <a:latin typeface="Lucida Console" pitchFamily="49" charset="0"/>
-              </a:rPr>
-              <a:t>", "</a:t>
-            </a:r>
-            <a:r>
-              <a:rPr lang="en-US" dirty="0" err="1">
-                <a:latin typeface="Lucida Console" pitchFamily="49" charset="0"/>
-              </a:rPr>
-              <a:t>Salamon</a:t>
-            </a:r>
-            <a:r>
-              <a:rPr lang="en-US" dirty="0">
-                <a:latin typeface="Lucida Console" pitchFamily="49" charset="0"/>
-              </a:rPr>
-              <a:t>", "Krakow");</a:t>
-            </a:r>
-          </a:p>
-          <a:p>
-            <a:r>
-              <a:rPr lang="pl-PL" dirty="0" err="1">
-                <a:latin typeface="Lucida Console" pitchFamily="49" charset="0"/>
-              </a:rPr>
-              <a:t>session.save</a:t>
-            </a:r>
-            <a:r>
-              <a:rPr lang="pl-PL" dirty="0">
-                <a:latin typeface="Lucida Console" pitchFamily="49" charset="0"/>
-              </a:rPr>
-              <a:t>(e);</a:t>
-            </a:r>
-          </a:p>
-          <a:p>
-            <a:endParaRPr lang="pl-PL" dirty="0">
-              <a:latin typeface="Lucida Console" pitchFamily="49" charset="0"/>
-            </a:endParaRPr>
-          </a:p>
-          <a:p>
-            <a:r>
-              <a:rPr lang="en-US" dirty="0">
-                <a:latin typeface="Lucida Console" pitchFamily="49" charset="0"/>
-              </a:rPr>
-              <a:t>Order o = new Order(e, c);</a:t>
-            </a:r>
-          </a:p>
-          <a:p>
-            <a:r>
-              <a:rPr lang="pl-PL" dirty="0" err="1">
-                <a:latin typeface="Lucida Console" pitchFamily="49" charset="0"/>
-              </a:rPr>
-              <a:t>session.save</a:t>
-            </a:r>
-            <a:r>
-              <a:rPr lang="pl-PL" dirty="0">
-                <a:latin typeface="Lucida Console" pitchFamily="49" charset="0"/>
-              </a:rPr>
-              <a:t>(o);</a:t>
-            </a:r>
-            <a:endParaRPr lang="pl-PL" dirty="0">
-              <a:latin typeface="Lucida Console" pitchFamily="49" charset="0"/>
-            </a:endParaRPr>
-          </a:p>
-        </p:txBody>
-      </p:sp>
+      </p:pic>
     </p:spTree>
     <p:extLst>
       <p:ext uri="{BB962C8B-B14F-4D97-AF65-F5344CB8AC3E}">
-        <p14:creationId xmlns:p14="http://schemas.microsoft.com/office/powerpoint/2010/main" val="4222481412"/>
+        <p14:creationId xmlns:p14="http://schemas.microsoft.com/office/powerpoint/2010/main" val="2580870810"/>
       </p:ext>
     </p:extLst>
   </p:cSld>
@@ -7344,401 +7013,80 @@
           <a:p>
             <a:r>
               <a:rPr lang="pl-PL" dirty="0" smtClean="0"/>
-              <a:t>Read…</a:t>
+              <a:t>Order.hbm.xml</a:t>
             </a:r>
             <a:endParaRPr lang="pl-PL" dirty="0"/>
           </a:p>
         </p:txBody>
       </p:sp>
-      <p:sp>
-        <p:nvSpPr>
-          <p:cNvPr id="4" name="Prostokąt 3"/>
-          <p:cNvSpPr/>
+      <p:pic>
+        <p:nvPicPr>
+          <p:cNvPr id="11267" name="Picture 3"/>
+          <p:cNvPicPr>
+            <a:picLocks noChangeAspect="1" noChangeArrowheads="1"/>
+          </p:cNvPicPr>
           <p:nvPr/>
-        </p:nvSpPr>
-        <p:spPr>
+        </p:nvPicPr>
+        <p:blipFill>
+          <a:blip r:embed="rId2">
+            <a:extLst>
+              <a:ext uri="{28A0092B-C50C-407E-A947-70E740481C1C}">
+                <a14:useLocalDpi xmlns:a14="http://schemas.microsoft.com/office/drawing/2010/main" val="0"/>
+              </a:ext>
+            </a:extLst>
+          </a:blip>
+          <a:srcRect/>
+          <a:stretch>
+            <a:fillRect/>
+          </a:stretch>
+        </p:blipFill>
+        <p:spPr bwMode="auto">
           <a:xfrm>
-            <a:off x="273665" y="1700808"/>
-            <a:ext cx="8496944" cy="3354765"/>
+            <a:off x="137162" y="1340768"/>
+            <a:ext cx="9010650" cy="5114925"/>
           </a:xfrm>
           <a:prstGeom prst="rect">
             <a:avLst/>
           </a:prstGeom>
+          <a:noFill/>
+          <a:ln>
+            <a:noFill/>
+          </a:ln>
+          <a:effectLst/>
+          <a:extLst>
+            <a:ext uri="{909E8E84-426E-40DD-AFC4-6F175D3DCCD1}">
+              <a14:hiddenFill xmlns:a14="http://schemas.microsoft.com/office/drawing/2010/main">
+                <a:solidFill>
+                  <a:schemeClr val="accent1"/>
+                </a:solidFill>
+              </a14:hiddenFill>
+            </a:ext>
+            <a:ext uri="{91240B29-F687-4F45-9708-019B960494DF}">
+              <a14:hiddenLine xmlns:a14="http://schemas.microsoft.com/office/drawing/2010/main" w="9525">
+                <a:solidFill>
+                  <a:schemeClr val="tx1"/>
+                </a:solidFill>
+                <a:miter lim="800000"/>
+                <a:headEnd/>
+                <a:tailEnd/>
+              </a14:hiddenLine>
+            </a:ext>
+            <a:ext uri="{AF507438-7753-43E0-B8FC-AC1667EBCBE1}">
+              <a14:hiddenEffects xmlns:a14="http://schemas.microsoft.com/office/drawing/2010/main">
+                <a:effectLst>
+                  <a:outerShdw dist="35921" dir="2700000" algn="ctr" rotWithShape="0">
+                    <a:schemeClr val="bg2"/>
+                  </a:outerShdw>
+                </a:effectLst>
+              </a14:hiddenEffects>
+            </a:ext>
+          </a:extLst>
         </p:spPr>
-        <p:txBody>
-          <a:bodyPr wrap="square">
-            <a:spAutoFit/>
-          </a:bodyPr>
-          <a:lstStyle/>
-          <a:p>
-            <a:r>
-              <a:rPr lang="pl-PL" sz="1600" dirty="0">
-                <a:latin typeface="Lucida Console" pitchFamily="49" charset="0"/>
-              </a:rPr>
-              <a:t>List&lt;Order&gt; </a:t>
-            </a:r>
-            <a:r>
-              <a:rPr lang="pl-PL" sz="1600" dirty="0" err="1">
-                <a:latin typeface="Lucida Console" pitchFamily="49" charset="0"/>
-              </a:rPr>
-              <a:t>ordersList</a:t>
-            </a:r>
-            <a:r>
-              <a:rPr lang="pl-PL" sz="1600" dirty="0">
-                <a:latin typeface="Lucida Console" pitchFamily="49" charset="0"/>
-              </a:rPr>
-              <a:t> = </a:t>
-            </a:r>
-            <a:r>
-              <a:rPr lang="pl-PL" sz="1600" dirty="0" err="1">
-                <a:latin typeface="Lucida Console" pitchFamily="49" charset="0"/>
-              </a:rPr>
-              <a:t>newSession</a:t>
-            </a:r>
-            <a:endParaRPr lang="pl-PL" sz="1600" dirty="0">
-              <a:latin typeface="Lucida Console" pitchFamily="49" charset="0"/>
-            </a:endParaRPr>
-          </a:p>
-          <a:p>
-            <a:r>
-              <a:rPr lang="en-US" sz="1600" dirty="0">
-                <a:latin typeface="Lucida Console" pitchFamily="49" charset="0"/>
-              </a:rPr>
-              <a:t>.</a:t>
-            </a:r>
-            <a:r>
-              <a:rPr lang="en-US" sz="1600" dirty="0" err="1">
-                <a:latin typeface="Lucida Console" pitchFamily="49" charset="0"/>
-              </a:rPr>
-              <a:t>createSQLQuery</a:t>
-            </a:r>
-            <a:r>
-              <a:rPr lang="en-US" sz="1600" dirty="0">
-                <a:latin typeface="Lucida Console" pitchFamily="49" charset="0"/>
-              </a:rPr>
-              <a:t>("select * from Orders where </a:t>
-            </a:r>
-            <a:r>
-              <a:rPr lang="en-US" sz="1600" dirty="0" err="1">
-                <a:latin typeface="Lucida Console" pitchFamily="49" charset="0"/>
-              </a:rPr>
-              <a:t>OrderID</a:t>
-            </a:r>
-            <a:r>
-              <a:rPr lang="en-US" sz="1600" dirty="0">
-                <a:latin typeface="Lucida Console" pitchFamily="49" charset="0"/>
-              </a:rPr>
-              <a:t>=11078")</a:t>
-            </a:r>
-          </a:p>
-          <a:p>
-            <a:r>
-              <a:rPr lang="pl-PL" sz="1600" dirty="0">
-                <a:latin typeface="Lucida Console" pitchFamily="49" charset="0"/>
-              </a:rPr>
-              <a:t>.</a:t>
-            </a:r>
-            <a:r>
-              <a:rPr lang="pl-PL" sz="1600" dirty="0" err="1">
-                <a:latin typeface="Lucida Console" pitchFamily="49" charset="0"/>
-              </a:rPr>
-              <a:t>addEntity</a:t>
-            </a:r>
-            <a:r>
-              <a:rPr lang="pl-PL" sz="1600" dirty="0">
-                <a:latin typeface="Lucida Console" pitchFamily="49" charset="0"/>
-              </a:rPr>
-              <a:t>(</a:t>
-            </a:r>
-            <a:r>
-              <a:rPr lang="pl-PL" sz="1600" dirty="0" err="1">
-                <a:latin typeface="Lucida Console" pitchFamily="49" charset="0"/>
-              </a:rPr>
-              <a:t>Order.class</a:t>
-            </a:r>
-            <a:r>
-              <a:rPr lang="pl-PL" sz="1600" dirty="0">
-                <a:latin typeface="Lucida Console" pitchFamily="49" charset="0"/>
-              </a:rPr>
-              <a:t>).list();</a:t>
-            </a:r>
-          </a:p>
-          <a:p>
-            <a:endParaRPr lang="pl-PL" sz="1600" dirty="0">
-              <a:latin typeface="Lucida Console" pitchFamily="49" charset="0"/>
-            </a:endParaRPr>
-          </a:p>
-          <a:p>
-            <a:r>
-              <a:rPr lang="pl-PL" sz="1600" dirty="0">
-                <a:latin typeface="Lucida Console" pitchFamily="49" charset="0"/>
-              </a:rPr>
-              <a:t>for (</a:t>
-            </a:r>
-            <a:r>
-              <a:rPr lang="pl-PL" sz="1600" dirty="0" err="1">
-                <a:latin typeface="Lucida Console" pitchFamily="49" charset="0"/>
-              </a:rPr>
-              <a:t>Iterator</a:t>
-            </a:r>
-            <a:r>
-              <a:rPr lang="pl-PL" sz="1600" dirty="0">
-                <a:latin typeface="Lucida Console" pitchFamily="49" charset="0"/>
-              </a:rPr>
-              <a:t>&lt;Order&gt; </a:t>
-            </a:r>
-            <a:r>
-              <a:rPr lang="pl-PL" sz="1600" dirty="0" err="1">
-                <a:latin typeface="Lucida Console" pitchFamily="49" charset="0"/>
-              </a:rPr>
-              <a:t>iter</a:t>
-            </a:r>
-            <a:r>
-              <a:rPr lang="pl-PL" sz="1600" dirty="0">
-                <a:latin typeface="Lucida Console" pitchFamily="49" charset="0"/>
-              </a:rPr>
-              <a:t> = </a:t>
-            </a:r>
-            <a:r>
-              <a:rPr lang="pl-PL" sz="1600" dirty="0" err="1">
-                <a:latin typeface="Lucida Console" pitchFamily="49" charset="0"/>
-              </a:rPr>
-              <a:t>ordersList.iterator</a:t>
-            </a:r>
-            <a:r>
-              <a:rPr lang="pl-PL" sz="1600" dirty="0">
-                <a:latin typeface="Lucida Console" pitchFamily="49" charset="0"/>
-              </a:rPr>
-              <a:t>(); </a:t>
-            </a:r>
-            <a:r>
-              <a:rPr lang="pl-PL" sz="1600" dirty="0" err="1">
-                <a:latin typeface="Lucida Console" pitchFamily="49" charset="0"/>
-              </a:rPr>
-              <a:t>iter.hasNext</a:t>
-            </a:r>
-            <a:r>
-              <a:rPr lang="pl-PL" sz="1600" dirty="0">
-                <a:latin typeface="Lucida Console" pitchFamily="49" charset="0"/>
-              </a:rPr>
-              <a:t>();) {</a:t>
-            </a:r>
-          </a:p>
-          <a:p>
-            <a:pPr lvl="1"/>
-            <a:r>
-              <a:rPr lang="pl-PL" sz="1600" dirty="0">
-                <a:latin typeface="Lucida Console" pitchFamily="49" charset="0"/>
-              </a:rPr>
-              <a:t>Order </a:t>
-            </a:r>
-            <a:r>
-              <a:rPr lang="pl-PL" sz="1600" dirty="0" err="1">
-                <a:latin typeface="Lucida Console" pitchFamily="49" charset="0"/>
-              </a:rPr>
-              <a:t>order</a:t>
-            </a:r>
-            <a:r>
-              <a:rPr lang="pl-PL" sz="1600" dirty="0">
-                <a:latin typeface="Lucida Console" pitchFamily="49" charset="0"/>
-              </a:rPr>
-              <a:t> = (Order) </a:t>
-            </a:r>
-            <a:r>
-              <a:rPr lang="pl-PL" sz="1600" dirty="0" err="1">
-                <a:latin typeface="Lucida Console" pitchFamily="49" charset="0"/>
-              </a:rPr>
-              <a:t>iter.next</a:t>
-            </a:r>
-            <a:r>
-              <a:rPr lang="pl-PL" sz="1600" dirty="0">
-                <a:latin typeface="Lucida Console" pitchFamily="49" charset="0"/>
-              </a:rPr>
-              <a:t>();</a:t>
-            </a:r>
-          </a:p>
-          <a:p>
-            <a:pPr lvl="1"/>
-            <a:r>
-              <a:rPr lang="pl-PL" sz="1600" dirty="0" err="1">
-                <a:latin typeface="Lucida Console" pitchFamily="49" charset="0"/>
-              </a:rPr>
-              <a:t>Employee</a:t>
-            </a:r>
-            <a:r>
-              <a:rPr lang="pl-PL" sz="1600" dirty="0">
-                <a:latin typeface="Lucida Console" pitchFamily="49" charset="0"/>
-              </a:rPr>
-              <a:t> </a:t>
-            </a:r>
-            <a:r>
-              <a:rPr lang="pl-PL" sz="1600" dirty="0" err="1">
-                <a:latin typeface="Lucida Console" pitchFamily="49" charset="0"/>
-              </a:rPr>
-              <a:t>empl</a:t>
-            </a:r>
-            <a:r>
-              <a:rPr lang="pl-PL" sz="1600" dirty="0">
-                <a:latin typeface="Lucida Console" pitchFamily="49" charset="0"/>
-              </a:rPr>
-              <a:t> = </a:t>
-            </a:r>
-            <a:r>
-              <a:rPr lang="pl-PL" sz="1600" dirty="0" err="1">
-                <a:latin typeface="Lucida Console" pitchFamily="49" charset="0"/>
-              </a:rPr>
-              <a:t>order.getEmployeeID</a:t>
-            </a:r>
-            <a:r>
-              <a:rPr lang="pl-PL" sz="1600" dirty="0">
-                <a:latin typeface="Lucida Console" pitchFamily="49" charset="0"/>
-              </a:rPr>
-              <a:t>();</a:t>
-            </a:r>
-          </a:p>
-          <a:p>
-            <a:pPr lvl="1"/>
-            <a:r>
-              <a:rPr lang="pl-PL" sz="1600" dirty="0" err="1">
-                <a:latin typeface="Lucida Console" pitchFamily="49" charset="0"/>
-              </a:rPr>
-              <a:t>Customer</a:t>
-            </a:r>
-            <a:r>
-              <a:rPr lang="pl-PL" sz="1600" dirty="0">
-                <a:latin typeface="Lucida Console" pitchFamily="49" charset="0"/>
-              </a:rPr>
-              <a:t> </a:t>
-            </a:r>
-            <a:r>
-              <a:rPr lang="pl-PL" sz="1600" dirty="0" err="1">
-                <a:latin typeface="Lucida Console" pitchFamily="49" charset="0"/>
-              </a:rPr>
-              <a:t>cust</a:t>
-            </a:r>
-            <a:r>
-              <a:rPr lang="pl-PL" sz="1600" dirty="0">
-                <a:latin typeface="Lucida Console" pitchFamily="49" charset="0"/>
-              </a:rPr>
-              <a:t> = </a:t>
-            </a:r>
-            <a:r>
-              <a:rPr lang="pl-PL" sz="1600" dirty="0" err="1">
-                <a:latin typeface="Lucida Console" pitchFamily="49" charset="0"/>
-              </a:rPr>
-              <a:t>order.getCustomerID</a:t>
-            </a:r>
-            <a:r>
-              <a:rPr lang="pl-PL" sz="1600" dirty="0">
-                <a:latin typeface="Lucida Console" pitchFamily="49" charset="0"/>
-              </a:rPr>
-              <a:t>();</a:t>
-            </a:r>
-          </a:p>
-          <a:p>
-            <a:pPr lvl="1"/>
-            <a:r>
-              <a:rPr lang="pl-PL" sz="1600" dirty="0" err="1">
-                <a:latin typeface="Lucida Console" pitchFamily="49" charset="0"/>
-              </a:rPr>
-              <a:t>System.</a:t>
-            </a:r>
-            <a:r>
-              <a:rPr lang="pl-PL" sz="1600" i="1" dirty="0" err="1">
-                <a:latin typeface="Lucida Console" pitchFamily="49" charset="0"/>
-              </a:rPr>
-              <a:t>out.println</a:t>
-            </a:r>
-            <a:r>
-              <a:rPr lang="pl-PL" sz="1600" i="1" dirty="0">
-                <a:latin typeface="Lucida Console" pitchFamily="49" charset="0"/>
-              </a:rPr>
-              <a:t>(</a:t>
-            </a:r>
-            <a:r>
-              <a:rPr lang="pl-PL" sz="1600" i="1" dirty="0" err="1">
-                <a:latin typeface="Lucida Console" pitchFamily="49" charset="0"/>
-              </a:rPr>
-              <a:t>order.getOrderID</a:t>
-            </a:r>
-            <a:r>
-              <a:rPr lang="pl-PL" sz="1600" i="1" dirty="0">
-                <a:latin typeface="Lucida Console" pitchFamily="49" charset="0"/>
-              </a:rPr>
-              <a:t>() + " by "</a:t>
-            </a:r>
-          </a:p>
-          <a:p>
-            <a:pPr lvl="2"/>
-            <a:r>
-              <a:rPr lang="pl-PL" sz="1600" dirty="0">
-                <a:latin typeface="Lucida Console" pitchFamily="49" charset="0"/>
-              </a:rPr>
-              <a:t>+ </a:t>
-            </a:r>
-            <a:r>
-              <a:rPr lang="pl-PL" sz="1600" dirty="0" err="1">
-                <a:latin typeface="Lucida Console" pitchFamily="49" charset="0"/>
-              </a:rPr>
-              <a:t>empl.getFirstName</a:t>
-            </a:r>
-            <a:r>
-              <a:rPr lang="pl-PL" sz="1600" dirty="0">
-                <a:latin typeface="Lucida Console" pitchFamily="49" charset="0"/>
-              </a:rPr>
-              <a:t>() + " " + </a:t>
-            </a:r>
-            <a:r>
-              <a:rPr lang="pl-PL" sz="1600" dirty="0" err="1">
-                <a:latin typeface="Lucida Console" pitchFamily="49" charset="0"/>
-              </a:rPr>
-              <a:t>empl.getLastName</a:t>
-            </a:r>
-            <a:r>
-              <a:rPr lang="pl-PL" sz="1600" dirty="0">
-                <a:latin typeface="Lucida Console" pitchFamily="49" charset="0"/>
-              </a:rPr>
-              <a:t>() + " for "</a:t>
-            </a:r>
-          </a:p>
-          <a:p>
-            <a:pPr lvl="2"/>
-            <a:r>
-              <a:rPr lang="pl-PL" sz="1600" dirty="0">
-                <a:latin typeface="Lucida Console" pitchFamily="49" charset="0"/>
-              </a:rPr>
-              <a:t>+ </a:t>
-            </a:r>
-            <a:r>
-              <a:rPr lang="pl-PL" sz="1600" dirty="0" err="1">
-                <a:latin typeface="Lucida Console" pitchFamily="49" charset="0"/>
-              </a:rPr>
-              <a:t>cust.getCompanyName</a:t>
-            </a:r>
-            <a:r>
-              <a:rPr lang="pl-PL" sz="1600" dirty="0">
-                <a:latin typeface="Lucida Console" pitchFamily="49" charset="0"/>
-              </a:rPr>
-              <a:t>());</a:t>
-            </a:r>
-          </a:p>
-          <a:p>
-            <a:r>
-              <a:rPr lang="pl-PL" sz="1600" dirty="0">
-                <a:latin typeface="Lucida Console" pitchFamily="49" charset="0"/>
-              </a:rPr>
-              <a:t>}</a:t>
-            </a:r>
-            <a:endParaRPr lang="pl-PL" sz="1600" dirty="0">
-              <a:latin typeface="Lucida Console" pitchFamily="49" charset="0"/>
-            </a:endParaRPr>
-          </a:p>
-        </p:txBody>
-      </p:sp>
+      </p:pic>
     </p:spTree>
     <p:extLst>
       <p:ext uri="{BB962C8B-B14F-4D97-AF65-F5344CB8AC3E}">
-        <p14:creationId xmlns:p14="http://schemas.microsoft.com/office/powerpoint/2010/main" val="1389485315"/>
+        <p14:creationId xmlns:p14="http://schemas.microsoft.com/office/powerpoint/2010/main" val="1369416663"/>
       </p:ext>
     </p:extLst>
   </p:cSld>
@@ -7781,8 +7129,16 @@
           <a:lstStyle/>
           <a:p>
             <a:r>
+              <a:rPr lang="pl-PL" dirty="0" err="1" smtClean="0"/>
+              <a:t>Session</a:t>
+            </a:r>
+            <a:r>
               <a:rPr lang="pl-PL" dirty="0" smtClean="0"/>
-              <a:t>Update…</a:t>
+              <a:t> </a:t>
+            </a:r>
+            <a:r>
+              <a:rPr lang="pl-PL" dirty="0" err="1" smtClean="0"/>
+              <a:t>Factory</a:t>
             </a:r>
             <a:endParaRPr lang="pl-PL" dirty="0"/>
           </a:p>
@@ -7790,14 +7146,14 @@
       </p:sp>
       <p:sp>
         <p:nvSpPr>
-          <p:cNvPr id="4" name="Prostokąt 3"/>
+          <p:cNvPr id="6" name="Prostokąt 5"/>
           <p:cNvSpPr/>
           <p:nvPr/>
         </p:nvSpPr>
         <p:spPr>
           <a:xfrm>
-            <a:off x="539552" y="2228671"/>
-            <a:ext cx="7776864" cy="2585323"/>
+            <a:off x="269412" y="1988840"/>
+            <a:ext cx="8496944" cy="3754874"/>
           </a:xfrm>
           <a:prstGeom prst="rect">
             <a:avLst/>
@@ -7810,168 +7166,501 @@
           <a:lstStyle/>
           <a:p>
             <a:r>
-              <a:rPr lang="pl-PL" dirty="0" err="1">
-                <a:latin typeface="Lucida Console" pitchFamily="49" charset="0"/>
-              </a:rPr>
-              <a:t>Customer</a:t>
-            </a:r>
-            <a:r>
-              <a:rPr lang="pl-PL" dirty="0">
-                <a:latin typeface="Lucida Console" pitchFamily="49" charset="0"/>
-              </a:rPr>
-              <a:t> c = </a:t>
-            </a:r>
-            <a:r>
-              <a:rPr lang="pl-PL" dirty="0" err="1">
-                <a:latin typeface="Lucida Console" pitchFamily="49" charset="0"/>
-              </a:rPr>
-              <a:t>new</a:t>
-            </a:r>
-            <a:r>
-              <a:rPr lang="pl-PL" dirty="0">
+              <a:rPr lang="pl-PL" sz="1400" dirty="0" err="1">
+                <a:latin typeface="Lucida Console" pitchFamily="49" charset="0"/>
+              </a:rPr>
+              <a:t>private</a:t>
+            </a:r>
+            <a:r>
+              <a:rPr lang="pl-PL" sz="1400" dirty="0">
                 <a:latin typeface="Lucida Console" pitchFamily="49" charset="0"/>
               </a:rPr>
               <a:t> </a:t>
             </a:r>
             <a:r>
-              <a:rPr lang="pl-PL" dirty="0" err="1">
-                <a:latin typeface="Lucida Console" pitchFamily="49" charset="0"/>
-              </a:rPr>
-              <a:t>Customer</a:t>
-            </a:r>
-            <a:r>
-              <a:rPr lang="pl-PL" dirty="0">
-                <a:latin typeface="Lucida Console" pitchFamily="49" charset="0"/>
-              </a:rPr>
-              <a:t>();</a:t>
-            </a:r>
-          </a:p>
-          <a:p>
-            <a:r>
-              <a:rPr lang="pl-PL" dirty="0" err="1">
-                <a:latin typeface="Lucida Console" pitchFamily="49" charset="0"/>
-              </a:rPr>
-              <a:t>c.customerID</a:t>
-            </a:r>
-            <a:r>
-              <a:rPr lang="pl-PL" dirty="0">
-                <a:latin typeface="Lucida Console" pitchFamily="49" charset="0"/>
-              </a:rPr>
-              <a:t> = "AXAMI";</a:t>
-            </a:r>
-          </a:p>
-          <a:p>
-            <a:r>
-              <a:rPr lang="pl-PL" dirty="0" err="1">
-                <a:latin typeface="Lucida Console" pitchFamily="49" charset="0"/>
-              </a:rPr>
-              <a:t>c.companyName</a:t>
-            </a:r>
-            <a:r>
-              <a:rPr lang="pl-PL" dirty="0">
-                <a:latin typeface="Lucida Console" pitchFamily="49" charset="0"/>
-              </a:rPr>
-              <a:t> = "</a:t>
-            </a:r>
-            <a:r>
-              <a:rPr lang="pl-PL" dirty="0" err="1">
-                <a:latin typeface="Lucida Console" pitchFamily="49" charset="0"/>
-              </a:rPr>
-              <a:t>Axamit</a:t>
-            </a:r>
-            <a:r>
-              <a:rPr lang="pl-PL" dirty="0">
-                <a:latin typeface="Lucida Console" pitchFamily="49" charset="0"/>
-              </a:rPr>
-              <a:t> &amp; Sons";</a:t>
-            </a:r>
-          </a:p>
-          <a:p>
-            <a:r>
-              <a:rPr lang="pl-PL" dirty="0" err="1">
-                <a:latin typeface="Lucida Console" pitchFamily="49" charset="0"/>
-              </a:rPr>
-              <a:t>session.update</a:t>
-            </a:r>
-            <a:r>
-              <a:rPr lang="pl-PL" dirty="0">
-                <a:latin typeface="Lucida Console" pitchFamily="49" charset="0"/>
-              </a:rPr>
-              <a:t>(c</a:t>
-            </a:r>
-            <a:r>
-              <a:rPr lang="pl-PL" dirty="0" smtClean="0">
-                <a:latin typeface="Lucida Console" pitchFamily="49" charset="0"/>
-              </a:rPr>
-              <a:t>);</a:t>
-            </a:r>
-          </a:p>
-          <a:p>
-            <a:endParaRPr lang="pl-PL" dirty="0" smtClean="0">
+              <a:rPr lang="pl-PL" sz="1400" dirty="0" err="1">
+                <a:latin typeface="Lucida Console" pitchFamily="49" charset="0"/>
+              </a:rPr>
+              <a:t>static</a:t>
+            </a:r>
+            <a:r>
+              <a:rPr lang="pl-PL" sz="1400" dirty="0">
+                <a:latin typeface="Lucida Console" pitchFamily="49" charset="0"/>
+              </a:rPr>
+              <a:t> </a:t>
+            </a:r>
+            <a:r>
+              <a:rPr lang="pl-PL" sz="1400" dirty="0" err="1">
+                <a:latin typeface="Lucida Console" pitchFamily="49" charset="0"/>
+              </a:rPr>
+              <a:t>SessionFactory</a:t>
+            </a:r>
+            <a:r>
+              <a:rPr lang="pl-PL" sz="1400" dirty="0">
+                <a:latin typeface="Lucida Console" pitchFamily="49" charset="0"/>
+              </a:rPr>
+              <a:t> </a:t>
+            </a:r>
+            <a:r>
+              <a:rPr lang="pl-PL" sz="1400" dirty="0" err="1">
+                <a:latin typeface="Lucida Console" pitchFamily="49" charset="0"/>
+              </a:rPr>
+              <a:t>sessionFactory</a:t>
+            </a:r>
+            <a:r>
+              <a:rPr lang="pl-PL" sz="1400" dirty="0">
+                <a:latin typeface="Lucida Console" pitchFamily="49" charset="0"/>
+              </a:rPr>
+              <a:t>;</a:t>
+            </a:r>
+          </a:p>
+          <a:p>
+            <a:r>
+              <a:rPr lang="pl-PL" sz="1400" dirty="0" err="1">
+                <a:latin typeface="Lucida Console" pitchFamily="49" charset="0"/>
+              </a:rPr>
+              <a:t>private</a:t>
+            </a:r>
+            <a:r>
+              <a:rPr lang="pl-PL" sz="1400" dirty="0">
+                <a:latin typeface="Lucida Console" pitchFamily="49" charset="0"/>
+              </a:rPr>
+              <a:t> </a:t>
+            </a:r>
+            <a:r>
+              <a:rPr lang="pl-PL" sz="1400" dirty="0" err="1">
+                <a:latin typeface="Lucida Console" pitchFamily="49" charset="0"/>
+              </a:rPr>
+              <a:t>static</a:t>
+            </a:r>
+            <a:r>
+              <a:rPr lang="pl-PL" sz="1400" dirty="0">
+                <a:latin typeface="Lucida Console" pitchFamily="49" charset="0"/>
+              </a:rPr>
+              <a:t> </a:t>
+            </a:r>
+            <a:r>
+              <a:rPr lang="pl-PL" sz="1400" dirty="0" err="1">
+                <a:latin typeface="Lucida Console" pitchFamily="49" charset="0"/>
+              </a:rPr>
+              <a:t>ServiceRegistry</a:t>
+            </a:r>
+            <a:r>
+              <a:rPr lang="pl-PL" sz="1400" dirty="0">
+                <a:latin typeface="Lucida Console" pitchFamily="49" charset="0"/>
+              </a:rPr>
+              <a:t> </a:t>
+            </a:r>
+            <a:r>
+              <a:rPr lang="pl-PL" sz="1400" dirty="0" err="1">
+                <a:latin typeface="Lucida Console" pitchFamily="49" charset="0"/>
+              </a:rPr>
+              <a:t>serviceRegistry</a:t>
+            </a:r>
+            <a:r>
+              <a:rPr lang="pl-PL" sz="1400" dirty="0">
+                <a:latin typeface="Lucida Console" pitchFamily="49" charset="0"/>
+              </a:rPr>
+              <a:t>;</a:t>
+            </a:r>
+          </a:p>
+          <a:p>
+            <a:endParaRPr lang="pl-PL" sz="1400" dirty="0">
               <a:latin typeface="Lucida Console" pitchFamily="49" charset="0"/>
             </a:endParaRPr>
           </a:p>
           <a:p>
-            <a:endParaRPr lang="pl-PL" dirty="0"/>
-          </a:p>
-          <a:p>
-            <a:r>
-              <a:rPr lang="en-US" dirty="0">
-                <a:latin typeface="Lucida Console" pitchFamily="49" charset="0"/>
-              </a:rPr>
-              <a:t>Employee e = new Employee("</a:t>
-            </a:r>
-            <a:r>
-              <a:rPr lang="en-US" dirty="0" err="1">
-                <a:latin typeface="Lucida Console" pitchFamily="49" charset="0"/>
-              </a:rPr>
-              <a:t>Salamon</a:t>
-            </a:r>
-            <a:r>
-              <a:rPr lang="en-US" dirty="0">
-                <a:latin typeface="Lucida Console" pitchFamily="49" charset="0"/>
-              </a:rPr>
-              <a:t>", "</a:t>
-            </a:r>
-            <a:r>
-              <a:rPr lang="en-US" dirty="0" err="1">
-                <a:latin typeface="Lucida Console" pitchFamily="49" charset="0"/>
-              </a:rPr>
-              <a:t>Ala</a:t>
-            </a:r>
-            <a:r>
-              <a:rPr lang="en-US" dirty="0">
-                <a:latin typeface="Lucida Console" pitchFamily="49" charset="0"/>
-              </a:rPr>
-              <a:t>", "Krakow");</a:t>
-            </a:r>
-          </a:p>
-          <a:p>
-            <a:r>
-              <a:rPr lang="pl-PL" dirty="0" err="1">
-                <a:latin typeface="Lucida Console" pitchFamily="49" charset="0"/>
-              </a:rPr>
-              <a:t>e.EmployeeID</a:t>
-            </a:r>
-            <a:r>
-              <a:rPr lang="pl-PL" dirty="0">
-                <a:latin typeface="Lucida Console" pitchFamily="49" charset="0"/>
-              </a:rPr>
-              <a:t>=10;</a:t>
-            </a:r>
-          </a:p>
-          <a:p>
-            <a:r>
-              <a:rPr lang="pl-PL" dirty="0" err="1">
-                <a:latin typeface="Lucida Console" pitchFamily="49" charset="0"/>
-              </a:rPr>
-              <a:t>session.update</a:t>
-            </a:r>
-            <a:r>
-              <a:rPr lang="pl-PL" dirty="0">
-                <a:latin typeface="Lucida Console" pitchFamily="49" charset="0"/>
-              </a:rPr>
-              <a:t>(e);</a:t>
+            <a:r>
+              <a:rPr lang="pl-PL" sz="1400" dirty="0" err="1">
+                <a:latin typeface="Lucida Console" pitchFamily="49" charset="0"/>
+              </a:rPr>
+              <a:t>private</a:t>
+            </a:r>
+            <a:r>
+              <a:rPr lang="pl-PL" sz="1400" dirty="0">
+                <a:latin typeface="Lucida Console" pitchFamily="49" charset="0"/>
+              </a:rPr>
+              <a:t> </a:t>
+            </a:r>
+            <a:r>
+              <a:rPr lang="pl-PL" sz="1400" dirty="0" err="1">
+                <a:latin typeface="Lucida Console" pitchFamily="49" charset="0"/>
+              </a:rPr>
+              <a:t>static</a:t>
+            </a:r>
+            <a:r>
+              <a:rPr lang="pl-PL" sz="1400" dirty="0">
+                <a:latin typeface="Lucida Console" pitchFamily="49" charset="0"/>
+              </a:rPr>
+              <a:t> </a:t>
+            </a:r>
+            <a:r>
+              <a:rPr lang="pl-PL" sz="1400" dirty="0" err="1">
+                <a:latin typeface="Lucida Console" pitchFamily="49" charset="0"/>
+              </a:rPr>
+              <a:t>SessionFactory</a:t>
+            </a:r>
+            <a:r>
+              <a:rPr lang="pl-PL" sz="1400" dirty="0">
+                <a:latin typeface="Lucida Console" pitchFamily="49" charset="0"/>
+              </a:rPr>
+              <a:t> </a:t>
+            </a:r>
+            <a:r>
+              <a:rPr lang="pl-PL" sz="1400" dirty="0" err="1">
+                <a:latin typeface="Lucida Console" pitchFamily="49" charset="0"/>
+              </a:rPr>
+              <a:t>buildSessionFactory</a:t>
+            </a:r>
+            <a:r>
+              <a:rPr lang="pl-PL" sz="1400" dirty="0">
+                <a:latin typeface="Lucida Console" pitchFamily="49" charset="0"/>
+              </a:rPr>
+              <a:t>() {</a:t>
+            </a:r>
+          </a:p>
+          <a:p>
+            <a:pPr lvl="1"/>
+            <a:r>
+              <a:rPr lang="pl-PL" sz="1400" dirty="0" err="1">
+                <a:latin typeface="Lucida Console" pitchFamily="49" charset="0"/>
+              </a:rPr>
+              <a:t>try</a:t>
+            </a:r>
+            <a:r>
+              <a:rPr lang="pl-PL" sz="1400" dirty="0">
+                <a:latin typeface="Lucida Console" pitchFamily="49" charset="0"/>
+              </a:rPr>
+              <a:t> {</a:t>
+            </a:r>
+          </a:p>
+          <a:p>
+            <a:pPr lvl="2"/>
+            <a:r>
+              <a:rPr lang="en-US" sz="1400" dirty="0">
+                <a:latin typeface="Lucida Console" pitchFamily="49" charset="0"/>
+              </a:rPr>
+              <a:t>// Create the </a:t>
+            </a:r>
+            <a:r>
+              <a:rPr lang="en-US" sz="1400" dirty="0" err="1">
+                <a:latin typeface="Lucida Console" pitchFamily="49" charset="0"/>
+              </a:rPr>
+              <a:t>SessionFactory</a:t>
+            </a:r>
+            <a:r>
+              <a:rPr lang="en-US" sz="1400" dirty="0">
+                <a:latin typeface="Lucida Console" pitchFamily="49" charset="0"/>
+              </a:rPr>
+              <a:t> from hibernate.cfg.xml</a:t>
+            </a:r>
+          </a:p>
+          <a:p>
+            <a:pPr lvl="2"/>
+            <a:r>
+              <a:rPr lang="pl-PL" sz="1400" dirty="0" err="1">
+                <a:latin typeface="Lucida Console" pitchFamily="49" charset="0"/>
+              </a:rPr>
+              <a:t>Configuration</a:t>
+            </a:r>
+            <a:r>
+              <a:rPr lang="pl-PL" sz="1400" dirty="0">
+                <a:latin typeface="Lucida Console" pitchFamily="49" charset="0"/>
+              </a:rPr>
+              <a:t> </a:t>
+            </a:r>
+            <a:r>
+              <a:rPr lang="pl-PL" sz="1400" dirty="0" err="1">
+                <a:latin typeface="Lucida Console" pitchFamily="49" charset="0"/>
+              </a:rPr>
+              <a:t>configuration</a:t>
+            </a:r>
+            <a:r>
+              <a:rPr lang="pl-PL" sz="1400" dirty="0">
+                <a:latin typeface="Lucida Console" pitchFamily="49" charset="0"/>
+              </a:rPr>
+              <a:t> = </a:t>
+            </a:r>
+            <a:r>
+              <a:rPr lang="pl-PL" sz="1400" dirty="0" err="1">
+                <a:latin typeface="Lucida Console" pitchFamily="49" charset="0"/>
+              </a:rPr>
+              <a:t>new</a:t>
+            </a:r>
+            <a:r>
+              <a:rPr lang="pl-PL" sz="1400" dirty="0">
+                <a:latin typeface="Lucida Console" pitchFamily="49" charset="0"/>
+              </a:rPr>
+              <a:t> </a:t>
+            </a:r>
+            <a:r>
+              <a:rPr lang="pl-PL" sz="1400" dirty="0" err="1">
+                <a:latin typeface="Lucida Console" pitchFamily="49" charset="0"/>
+              </a:rPr>
+              <a:t>Configuration</a:t>
+            </a:r>
+            <a:r>
+              <a:rPr lang="pl-PL" sz="1400" dirty="0">
+                <a:latin typeface="Lucida Console" pitchFamily="49" charset="0"/>
+              </a:rPr>
+              <a:t>().</a:t>
+            </a:r>
+            <a:r>
+              <a:rPr lang="pl-PL" sz="1400" dirty="0" err="1">
+                <a:latin typeface="Lucida Console" pitchFamily="49" charset="0"/>
+              </a:rPr>
+              <a:t>configure</a:t>
+            </a:r>
+            <a:r>
+              <a:rPr lang="pl-PL" sz="1400" dirty="0">
+                <a:latin typeface="Lucida Console" pitchFamily="49" charset="0"/>
+              </a:rPr>
+              <a:t>();</a:t>
+            </a:r>
+          </a:p>
+          <a:p>
+            <a:pPr lvl="1"/>
+            <a:endParaRPr lang="pl-PL" sz="1400" dirty="0">
+              <a:latin typeface="Lucida Console" pitchFamily="49" charset="0"/>
+            </a:endParaRPr>
+          </a:p>
+          <a:p>
+            <a:pPr lvl="2"/>
+            <a:r>
+              <a:rPr lang="pl-PL" sz="1400" dirty="0" err="1">
+                <a:latin typeface="Lucida Console" pitchFamily="49" charset="0"/>
+              </a:rPr>
+              <a:t>serviceRegistry</a:t>
+            </a:r>
+            <a:r>
+              <a:rPr lang="pl-PL" sz="1400" dirty="0">
+                <a:latin typeface="Lucida Console" pitchFamily="49" charset="0"/>
+              </a:rPr>
+              <a:t> = </a:t>
+            </a:r>
+            <a:r>
+              <a:rPr lang="pl-PL" sz="1400" dirty="0" err="1">
+                <a:latin typeface="Lucida Console" pitchFamily="49" charset="0"/>
+              </a:rPr>
+              <a:t>new</a:t>
+            </a:r>
+            <a:r>
+              <a:rPr lang="pl-PL" sz="1400" dirty="0">
+                <a:latin typeface="Lucida Console" pitchFamily="49" charset="0"/>
+              </a:rPr>
+              <a:t> </a:t>
+            </a:r>
+            <a:r>
+              <a:rPr lang="pl-PL" sz="1400" dirty="0" err="1">
+                <a:latin typeface="Lucida Console" pitchFamily="49" charset="0"/>
+              </a:rPr>
+              <a:t>ServiceRegistryBuilder</a:t>
+            </a:r>
+            <a:r>
+              <a:rPr lang="pl-PL" sz="1400" dirty="0">
+                <a:latin typeface="Lucida Console" pitchFamily="49" charset="0"/>
+              </a:rPr>
+              <a:t>().</a:t>
+            </a:r>
+            <a:r>
+              <a:rPr lang="pl-PL" sz="1400" dirty="0" err="1">
+                <a:latin typeface="Lucida Console" pitchFamily="49" charset="0"/>
+              </a:rPr>
+              <a:t>applySettings</a:t>
+            </a:r>
+            <a:r>
+              <a:rPr lang="pl-PL" sz="1400" dirty="0">
+                <a:latin typeface="Lucida Console" pitchFamily="49" charset="0"/>
+              </a:rPr>
+              <a:t>(</a:t>
+            </a:r>
+          </a:p>
+          <a:p>
+            <a:pPr lvl="2"/>
+            <a:r>
+              <a:rPr lang="pl-PL" sz="1400" dirty="0" err="1">
+                <a:latin typeface="Lucida Console" pitchFamily="49" charset="0"/>
+              </a:rPr>
+              <a:t>configuration.getProperties</a:t>
+            </a:r>
+            <a:r>
+              <a:rPr lang="pl-PL" sz="1400" dirty="0">
+                <a:latin typeface="Lucida Console" pitchFamily="49" charset="0"/>
+              </a:rPr>
+              <a:t>()).</a:t>
+            </a:r>
+            <a:r>
+              <a:rPr lang="pl-PL" sz="1400" dirty="0" err="1">
+                <a:latin typeface="Lucida Console" pitchFamily="49" charset="0"/>
+              </a:rPr>
+              <a:t>buildServiceRegistry</a:t>
+            </a:r>
+            <a:r>
+              <a:rPr lang="pl-PL" sz="1400" dirty="0">
+                <a:latin typeface="Lucida Console" pitchFamily="49" charset="0"/>
+              </a:rPr>
+              <a:t>();</a:t>
+            </a:r>
+          </a:p>
+          <a:p>
+            <a:pPr lvl="2"/>
+            <a:r>
+              <a:rPr lang="pl-PL" sz="1400" dirty="0" err="1">
+                <a:latin typeface="Lucida Console" pitchFamily="49" charset="0"/>
+              </a:rPr>
+              <a:t>sessionFactory</a:t>
+            </a:r>
+            <a:r>
+              <a:rPr lang="pl-PL" sz="1400" dirty="0">
+                <a:latin typeface="Lucida Console" pitchFamily="49" charset="0"/>
+              </a:rPr>
+              <a:t> = </a:t>
+            </a:r>
+            <a:r>
+              <a:rPr lang="pl-PL" sz="1400" dirty="0" err="1">
+                <a:latin typeface="Lucida Console" pitchFamily="49" charset="0"/>
+              </a:rPr>
+              <a:t>configuration.buildSessionFactory</a:t>
+            </a:r>
+            <a:r>
+              <a:rPr lang="pl-PL" sz="1400" dirty="0">
+                <a:latin typeface="Lucida Console" pitchFamily="49" charset="0"/>
+              </a:rPr>
+              <a:t>(</a:t>
+            </a:r>
+            <a:r>
+              <a:rPr lang="pl-PL" sz="1400" dirty="0" err="1">
+                <a:latin typeface="Lucida Console" pitchFamily="49" charset="0"/>
+              </a:rPr>
+              <a:t>serviceRegistry</a:t>
+            </a:r>
+            <a:r>
+              <a:rPr lang="pl-PL" sz="1400" dirty="0">
+                <a:latin typeface="Lucida Console" pitchFamily="49" charset="0"/>
+              </a:rPr>
+              <a:t>);</a:t>
+            </a:r>
+          </a:p>
+          <a:p>
+            <a:pPr lvl="2"/>
+            <a:endParaRPr lang="pl-PL" sz="1400" dirty="0">
+              <a:latin typeface="Lucida Console" pitchFamily="49" charset="0"/>
+            </a:endParaRPr>
+          </a:p>
+          <a:p>
+            <a:pPr lvl="2"/>
+            <a:r>
+              <a:rPr lang="pl-PL" sz="1400" dirty="0">
+                <a:latin typeface="Lucida Console" pitchFamily="49" charset="0"/>
+              </a:rPr>
+              <a:t>return </a:t>
+            </a:r>
+            <a:r>
+              <a:rPr lang="pl-PL" sz="1400" dirty="0" err="1">
+                <a:latin typeface="Lucida Console" pitchFamily="49" charset="0"/>
+              </a:rPr>
+              <a:t>sessionFactory</a:t>
+            </a:r>
+            <a:r>
+              <a:rPr lang="pl-PL" sz="1400" dirty="0">
+                <a:latin typeface="Lucida Console" pitchFamily="49" charset="0"/>
+              </a:rPr>
+              <a:t>;</a:t>
+            </a:r>
+          </a:p>
+          <a:p>
+            <a:pPr lvl="1"/>
+            <a:r>
+              <a:rPr lang="pl-PL" sz="1400" dirty="0">
+                <a:latin typeface="Lucida Console" pitchFamily="49" charset="0"/>
+              </a:rPr>
+              <a:t>} </a:t>
+            </a:r>
+            <a:r>
+              <a:rPr lang="pl-PL" sz="1400" dirty="0" err="1">
+                <a:latin typeface="Lucida Console" pitchFamily="49" charset="0"/>
+              </a:rPr>
+              <a:t>catch</a:t>
+            </a:r>
+            <a:r>
+              <a:rPr lang="pl-PL" sz="1400" dirty="0">
+                <a:latin typeface="Lucida Console" pitchFamily="49" charset="0"/>
+              </a:rPr>
+              <a:t> (</a:t>
+            </a:r>
+            <a:r>
+              <a:rPr lang="pl-PL" sz="1400" dirty="0" err="1">
+                <a:latin typeface="Lucida Console" pitchFamily="49" charset="0"/>
+              </a:rPr>
+              <a:t>HibernateException</a:t>
+            </a:r>
+            <a:r>
+              <a:rPr lang="pl-PL" sz="1400" dirty="0">
+                <a:latin typeface="Lucida Console" pitchFamily="49" charset="0"/>
+              </a:rPr>
+              <a:t> he) {</a:t>
+            </a:r>
+          </a:p>
+          <a:p>
+            <a:pPr lvl="1"/>
+            <a:r>
+              <a:rPr lang="pl-PL" sz="1400" dirty="0" smtClean="0">
+                <a:latin typeface="Lucida Console" pitchFamily="49" charset="0"/>
+              </a:rPr>
+              <a:t>	</a:t>
+            </a:r>
+            <a:r>
+              <a:rPr lang="pl-PL" sz="1400" dirty="0" err="1" smtClean="0">
+                <a:latin typeface="Lucida Console" pitchFamily="49" charset="0"/>
+              </a:rPr>
+              <a:t>throw</a:t>
+            </a:r>
+            <a:r>
+              <a:rPr lang="pl-PL" sz="1400" dirty="0" smtClean="0">
+                <a:latin typeface="Lucida Console" pitchFamily="49" charset="0"/>
+              </a:rPr>
+              <a:t> </a:t>
+            </a:r>
+            <a:r>
+              <a:rPr lang="pl-PL" sz="1400" dirty="0" err="1">
+                <a:latin typeface="Lucida Console" pitchFamily="49" charset="0"/>
+              </a:rPr>
+              <a:t>new</a:t>
+            </a:r>
+            <a:r>
+              <a:rPr lang="pl-PL" sz="1400" dirty="0">
+                <a:latin typeface="Lucida Console" pitchFamily="49" charset="0"/>
+              </a:rPr>
+              <a:t> </a:t>
+            </a:r>
+            <a:r>
+              <a:rPr lang="pl-PL" sz="1400" dirty="0" err="1">
+                <a:latin typeface="Lucida Console" pitchFamily="49" charset="0"/>
+              </a:rPr>
+              <a:t>ExceptionInInitializerError</a:t>
+            </a:r>
+            <a:r>
+              <a:rPr lang="pl-PL" sz="1400" dirty="0">
+                <a:latin typeface="Lucida Console" pitchFamily="49" charset="0"/>
+              </a:rPr>
+              <a:t>(he);</a:t>
+            </a:r>
+          </a:p>
+          <a:p>
+            <a:pPr lvl="1"/>
+            <a:r>
+              <a:rPr lang="pl-PL" sz="1400" dirty="0">
+                <a:latin typeface="Lucida Console" pitchFamily="49" charset="0"/>
+              </a:rPr>
+              <a:t>}</a:t>
+            </a:r>
+          </a:p>
+          <a:p>
+            <a:r>
+              <a:rPr lang="pl-PL" sz="1400" dirty="0">
+                <a:latin typeface="Lucida Console" pitchFamily="49" charset="0"/>
+              </a:rPr>
+              <a:t>}</a:t>
             </a:r>
           </a:p>
         </p:txBody>
@@ -7979,7 +7668,7 @@
     </p:spTree>
     <p:extLst>
       <p:ext uri="{BB962C8B-B14F-4D97-AF65-F5344CB8AC3E}">
-        <p14:creationId xmlns:p14="http://schemas.microsoft.com/office/powerpoint/2010/main" val="1526151245"/>
+        <p14:creationId xmlns:p14="http://schemas.microsoft.com/office/powerpoint/2010/main" val="1412715275"/>
       </p:ext>
     </p:extLst>
   </p:cSld>
@@ -8022,12 +7711,8 @@
           <a:lstStyle/>
           <a:p>
             <a:r>
-              <a:rPr lang="pl-PL" dirty="0" err="1" smtClean="0"/>
-              <a:t>Delete</a:t>
-            </a:r>
-            <a:r>
               <a:rPr lang="pl-PL" dirty="0" smtClean="0"/>
-              <a:t>…</a:t>
+              <a:t>Transakcje</a:t>
             </a:r>
             <a:endParaRPr lang="pl-PL" dirty="0"/>
           </a:p>
@@ -8035,14 +7720,14 @@
       </p:sp>
       <p:sp>
         <p:nvSpPr>
-          <p:cNvPr id="5" name="Prostokąt 4"/>
+          <p:cNvPr id="4" name="Prostokąt 3"/>
           <p:cNvSpPr/>
           <p:nvPr/>
         </p:nvSpPr>
         <p:spPr>
           <a:xfrm>
-            <a:off x="827584" y="1859340"/>
-            <a:ext cx="6030416" cy="3139321"/>
+            <a:off x="899592" y="1412776"/>
+            <a:ext cx="7416824" cy="5078313"/>
           </a:xfrm>
           <a:prstGeom prst="rect">
             <a:avLst/>
@@ -8055,36 +7740,40 @@
           <a:lstStyle/>
           <a:p>
             <a:r>
+              <a:rPr lang="pl-PL" dirty="0" err="1">
+                <a:latin typeface="Lucida Console" pitchFamily="49" charset="0"/>
+              </a:rPr>
+              <a:t>Transaction</a:t>
+            </a:r>
+            <a:r>
               <a:rPr lang="pl-PL" dirty="0">
                 <a:latin typeface="Lucida Console" pitchFamily="49" charset="0"/>
               </a:rPr>
-              <a:t>Order o = </a:t>
+              <a:t> </a:t>
             </a:r>
             <a:r>
               <a:rPr lang="pl-PL" dirty="0" err="1">
                 <a:latin typeface="Lucida Console" pitchFamily="49" charset="0"/>
               </a:rPr>
-              <a:t>new</a:t>
+              <a:t>trns</a:t>
             </a:r>
             <a:r>
               <a:rPr lang="pl-PL" dirty="0">
                 <a:latin typeface="Lucida Console" pitchFamily="49" charset="0"/>
               </a:rPr>
-              <a:t> Order();</a:t>
-            </a:r>
-          </a:p>
-          <a:p>
+              <a:t> = </a:t>
+            </a:r>
             <a:r>
               <a:rPr lang="pl-PL" dirty="0" err="1">
                 <a:latin typeface="Lucida Console" pitchFamily="49" charset="0"/>
               </a:rPr>
-              <a:t>o.setOrderID</a:t>
+              <a:t>null</a:t>
             </a:r>
             <a:r>
               <a:rPr lang="pl-PL" dirty="0">
                 <a:latin typeface="Lucida Console" pitchFamily="49" charset="0"/>
               </a:rPr>
-              <a:t>(11078);</a:t>
+              <a:t>;</a:t>
             </a:r>
           </a:p>
           <a:p>
@@ -8092,78 +7781,161 @@
               <a:rPr lang="pl-PL" dirty="0" err="1">
                 <a:latin typeface="Lucida Console" pitchFamily="49" charset="0"/>
               </a:rPr>
-              <a:t>session.delete</a:t>
+              <a:t>Session</a:t>
             </a:r>
             <a:r>
               <a:rPr lang="pl-PL" dirty="0">
                 <a:latin typeface="Lucida Console" pitchFamily="49" charset="0"/>
               </a:rPr>
-              <a:t>(o);</a:t>
-            </a:r>
-          </a:p>
-          <a:p>
+              <a:t> </a:t>
+            </a:r>
+            <a:r>
+              <a:rPr lang="pl-PL" dirty="0" err="1">
+                <a:latin typeface="Lucida Console" pitchFamily="49" charset="0"/>
+              </a:rPr>
+              <a:t>session</a:t>
+            </a:r>
+            <a:r>
+              <a:rPr lang="pl-PL" dirty="0">
+                <a:latin typeface="Lucida Console" pitchFamily="49" charset="0"/>
+              </a:rPr>
+              <a:t> = </a:t>
+            </a:r>
+            <a:r>
+              <a:rPr lang="pl-PL" dirty="0" err="1">
+                <a:latin typeface="Lucida Console" pitchFamily="49" charset="0"/>
+              </a:rPr>
+              <a:t>HibernateUtil.</a:t>
+            </a:r>
+            <a:r>
+              <a:rPr lang="pl-PL" i="1" dirty="0" err="1">
+                <a:latin typeface="Lucida Console" pitchFamily="49" charset="0"/>
+              </a:rPr>
+              <a:t>getSessionFactory</a:t>
+            </a:r>
+            <a:r>
+              <a:rPr lang="pl-PL" i="1" dirty="0">
+                <a:latin typeface="Lucida Console" pitchFamily="49" charset="0"/>
+              </a:rPr>
+              <a:t>().</a:t>
+            </a:r>
+            <a:r>
+              <a:rPr lang="pl-PL" i="1" dirty="0" err="1">
+                <a:latin typeface="Lucida Console" pitchFamily="49" charset="0"/>
+              </a:rPr>
+              <a:t>openSession</a:t>
+            </a:r>
+            <a:r>
+              <a:rPr lang="pl-PL" i="1" dirty="0" smtClean="0">
+                <a:latin typeface="Lucida Console" pitchFamily="49" charset="0"/>
+              </a:rPr>
+              <a:t>();</a:t>
+            </a:r>
+          </a:p>
+          <a:p>
+            <a:endParaRPr lang="pl-PL" i="1" dirty="0">
+              <a:latin typeface="Lucida Console" pitchFamily="49" charset="0"/>
+            </a:endParaRPr>
+          </a:p>
+          <a:p>
+            <a:r>
+              <a:rPr lang="pl-PL" dirty="0" err="1">
+                <a:latin typeface="Lucida Console" pitchFamily="49" charset="0"/>
+              </a:rPr>
+              <a:t>try</a:t>
+            </a:r>
+            <a:r>
+              <a:rPr lang="pl-PL" dirty="0">
+                <a:latin typeface="Lucida Console" pitchFamily="49" charset="0"/>
+              </a:rPr>
+              <a:t> {</a:t>
+            </a:r>
+          </a:p>
+          <a:p>
+            <a:r>
+              <a:rPr lang="pl-PL" dirty="0" smtClean="0">
+                <a:latin typeface="Lucida Console" pitchFamily="49" charset="0"/>
+              </a:rPr>
+              <a:t>	</a:t>
+            </a:r>
+            <a:r>
+              <a:rPr lang="pl-PL" dirty="0" err="1" smtClean="0">
+                <a:latin typeface="Lucida Console" pitchFamily="49" charset="0"/>
+              </a:rPr>
+              <a:t>trns</a:t>
+            </a:r>
+            <a:r>
+              <a:rPr lang="pl-PL" dirty="0" smtClean="0">
+                <a:latin typeface="Lucida Console" pitchFamily="49" charset="0"/>
+              </a:rPr>
+              <a:t> </a:t>
+            </a:r>
+            <a:r>
+              <a:rPr lang="pl-PL" dirty="0">
+                <a:latin typeface="Lucida Console" pitchFamily="49" charset="0"/>
+              </a:rPr>
+              <a:t>= </a:t>
+            </a:r>
+            <a:r>
+              <a:rPr lang="pl-PL" dirty="0" err="1">
+                <a:latin typeface="Lucida Console" pitchFamily="49" charset="0"/>
+              </a:rPr>
+              <a:t>session.beginTransaction</a:t>
+            </a:r>
+            <a:r>
+              <a:rPr lang="pl-PL" dirty="0">
+                <a:latin typeface="Lucida Console" pitchFamily="49" charset="0"/>
+              </a:rPr>
+              <a:t>();</a:t>
+            </a:r>
+          </a:p>
+          <a:p>
+            <a:r>
+              <a:rPr lang="pl-PL" dirty="0">
+                <a:latin typeface="Lucida Console" pitchFamily="49" charset="0"/>
+              </a:rPr>
+              <a:t>	</a:t>
+            </a:r>
+            <a:r>
+              <a:rPr lang="pl-PL" dirty="0" smtClean="0">
+                <a:latin typeface="Lucida Console" pitchFamily="49" charset="0"/>
+              </a:rPr>
+              <a:t>//...</a:t>
+            </a:r>
             <a:endParaRPr lang="pl-PL" dirty="0">
               <a:latin typeface="Lucida Console" pitchFamily="49" charset="0"/>
             </a:endParaRPr>
           </a:p>
           <a:p>
             <a:r>
+              <a:rPr lang="pl-PL" dirty="0" smtClean="0">
+                <a:latin typeface="Lucida Console" pitchFamily="49" charset="0"/>
+              </a:rPr>
+              <a:t>	</a:t>
+            </a:r>
+            <a:r>
+              <a:rPr lang="pl-PL" dirty="0" err="1" smtClean="0">
+                <a:latin typeface="Lucida Console" pitchFamily="49" charset="0"/>
+              </a:rPr>
+              <a:t>session.getTransaction</a:t>
+            </a:r>
+            <a:r>
+              <a:rPr lang="pl-PL" dirty="0">
+                <a:latin typeface="Lucida Console" pitchFamily="49" charset="0"/>
+              </a:rPr>
+              <a:t>().</a:t>
+            </a:r>
+            <a:r>
               <a:rPr lang="pl-PL" dirty="0" err="1">
                 <a:latin typeface="Lucida Console" pitchFamily="49" charset="0"/>
               </a:rPr>
-              <a:t>Customer</a:t>
-            </a:r>
-            <a:r>
-              <a:rPr lang="pl-PL" dirty="0">
-                <a:latin typeface="Lucida Console" pitchFamily="49" charset="0"/>
-              </a:rPr>
-              <a:t> c1 = </a:t>
-            </a:r>
-            <a:r>
-              <a:rPr lang="pl-PL" dirty="0" err="1">
-                <a:latin typeface="Lucida Console" pitchFamily="49" charset="0"/>
-              </a:rPr>
-              <a:t>new</a:t>
-            </a:r>
-            <a:r>
-              <a:rPr lang="pl-PL" dirty="0">
-                <a:latin typeface="Lucida Console" pitchFamily="49" charset="0"/>
-              </a:rPr>
-              <a:t> </a:t>
-            </a:r>
-            <a:r>
-              <a:rPr lang="pl-PL" dirty="0" err="1">
-                <a:latin typeface="Lucida Console" pitchFamily="49" charset="0"/>
-              </a:rPr>
-              <a:t>Customer</a:t>
-            </a:r>
-            <a:r>
-              <a:rPr lang="pl-PL" dirty="0">
+              <a:t>commit</a:t>
+            </a:r>
+            <a:r>
+              <a:rPr lang="pl-PL" dirty="0" smtClean="0">
                 <a:latin typeface="Lucida Console" pitchFamily="49" charset="0"/>
               </a:rPr>
               <a:t>();</a:t>
-            </a:r>
-          </a:p>
-          <a:p>
-            <a:r>
-              <a:rPr lang="pl-PL" dirty="0">
-                <a:latin typeface="Lucida Console" pitchFamily="49" charset="0"/>
-              </a:rPr>
-              <a:t>c1.setCustomerID("AXAMI");</a:t>
-            </a:r>
-          </a:p>
-          <a:p>
-            <a:r>
-              <a:rPr lang="pl-PL" dirty="0" err="1">
-                <a:latin typeface="Lucida Console" pitchFamily="49" charset="0"/>
-              </a:rPr>
-              <a:t>session.delete</a:t>
-            </a:r>
-            <a:r>
-              <a:rPr lang="pl-PL" dirty="0">
-                <a:latin typeface="Lucida Console" pitchFamily="49" charset="0"/>
-              </a:rPr>
-              <a:t>(c1);</a:t>
             </a:r>
           </a:p>
           <a:p>
@@ -8173,79 +7945,212 @@
           </a:p>
           <a:p>
             <a:r>
+              <a:rPr lang="pl-PL" dirty="0">
+                <a:latin typeface="Lucida Console" pitchFamily="49" charset="0"/>
+              </a:rPr>
+              <a:t>} </a:t>
+            </a:r>
+            <a:r>
               <a:rPr lang="pl-PL" dirty="0" err="1">
                 <a:latin typeface="Lucida Console" pitchFamily="49" charset="0"/>
               </a:rPr>
-              <a:t>Employee</a:t>
+              <a:t>catch</a:t>
             </a:r>
             <a:r>
               <a:rPr lang="pl-PL" dirty="0">
                 <a:latin typeface="Lucida Console" pitchFamily="49" charset="0"/>
               </a:rPr>
-              <a:t> e = </a:t>
+              <a:t> (</a:t>
             </a:r>
             <a:r>
               <a:rPr lang="pl-PL" dirty="0" err="1">
                 <a:latin typeface="Lucida Console" pitchFamily="49" charset="0"/>
               </a:rPr>
-              <a:t>new</a:t>
+              <a:t>RuntimeException</a:t>
             </a:r>
             <a:r>
               <a:rPr lang="pl-PL" dirty="0">
                 <a:latin typeface="Lucida Console" pitchFamily="49" charset="0"/>
               </a:rPr>
+              <a:t> e) {</a:t>
+            </a:r>
+          </a:p>
+          <a:p>
+            <a:r>
+              <a:rPr lang="pl-PL" dirty="0" smtClean="0">
+                <a:latin typeface="Lucida Console" pitchFamily="49" charset="0"/>
+              </a:rPr>
+              <a:t>	</a:t>
+            </a:r>
+            <a:r>
+              <a:rPr lang="pl-PL" dirty="0" err="1" smtClean="0">
+                <a:latin typeface="Lucida Console" pitchFamily="49" charset="0"/>
+              </a:rPr>
+              <a:t>if</a:t>
+            </a:r>
+            <a:r>
+              <a:rPr lang="pl-PL" dirty="0" smtClean="0">
+                <a:latin typeface="Lucida Console" pitchFamily="49" charset="0"/>
+              </a:rPr>
               <a:t> </a:t>
             </a:r>
             <a:r>
+              <a:rPr lang="pl-PL" dirty="0">
+                <a:latin typeface="Lucida Console" pitchFamily="49" charset="0"/>
+              </a:rPr>
+              <a:t>(</a:t>
+            </a:r>
+            <a:r>
               <a:rPr lang="pl-PL" dirty="0" err="1">
                 <a:latin typeface="Lucida Console" pitchFamily="49" charset="0"/>
               </a:rPr>
-              <a:t>Employee</a:t>
+              <a:t>trns</a:t>
             </a:r>
             <a:r>
               <a:rPr lang="pl-PL" dirty="0">
                 <a:latin typeface="Lucida Console" pitchFamily="49" charset="0"/>
               </a:rPr>
+              <a:t> != </a:t>
+            </a:r>
+            <a:r>
+              <a:rPr lang="pl-PL" dirty="0" err="1">
+                <a:latin typeface="Lucida Console" pitchFamily="49" charset="0"/>
+              </a:rPr>
+              <a:t>null</a:t>
+            </a:r>
+            <a:r>
+              <a:rPr lang="pl-PL" dirty="0">
+                <a:latin typeface="Lucida Console" pitchFamily="49" charset="0"/>
+              </a:rPr>
+              <a:t>) </a:t>
+            </a:r>
+          </a:p>
+          <a:p>
+            <a:r>
+              <a:rPr lang="pl-PL" dirty="0" smtClean="0">
+                <a:latin typeface="Lucida Console" pitchFamily="49" charset="0"/>
+              </a:rPr>
+              <a:t>		</a:t>
+            </a:r>
+            <a:r>
+              <a:rPr lang="pl-PL" dirty="0" err="1" smtClean="0">
+                <a:latin typeface="Lucida Console" pitchFamily="49" charset="0"/>
+              </a:rPr>
+              <a:t>trns.rollback</a:t>
+            </a:r>
+            <a:r>
+              <a:rPr lang="pl-PL" dirty="0">
+                <a:latin typeface="Lucida Console" pitchFamily="49" charset="0"/>
+              </a:rPr>
               <a:t>();</a:t>
             </a:r>
           </a:p>
           <a:p>
-            <a:r>
-              <a:rPr lang="pl-PL" dirty="0" err="1">
-                <a:latin typeface="Lucida Console" pitchFamily="49" charset="0"/>
-              </a:rPr>
-              <a:t>e.EmployeeID</a:t>
-            </a:r>
-            <a:r>
-              <a:rPr lang="pl-PL" dirty="0">
-                <a:latin typeface="Lucida Console" pitchFamily="49" charset="0"/>
-              </a:rPr>
-              <a:t> = 10;</a:t>
-            </a:r>
-          </a:p>
-          <a:p>
-            <a:r>
-              <a:rPr lang="pl-PL" dirty="0" err="1">
-                <a:latin typeface="Lucida Console" pitchFamily="49" charset="0"/>
-              </a:rPr>
-              <a:t>session.delete</a:t>
-            </a:r>
-            <a:r>
-              <a:rPr lang="pl-PL" dirty="0">
-                <a:latin typeface="Lucida Console" pitchFamily="49" charset="0"/>
-              </a:rPr>
-              <a:t>(e);</a:t>
-            </a:r>
+            <a:pPr lvl="1"/>
+            <a:r>
+              <a:rPr lang="pl-PL" dirty="0" smtClean="0">
+                <a:latin typeface="Lucida Console" pitchFamily="49" charset="0"/>
+              </a:rPr>
+              <a:t>	</a:t>
+            </a:r>
+            <a:r>
+              <a:rPr lang="pl-PL" dirty="0" err="1" smtClean="0">
+                <a:latin typeface="Lucida Console" pitchFamily="49" charset="0"/>
+              </a:rPr>
+              <a:t>e.printStackTrace</a:t>
+            </a:r>
+            <a:r>
+              <a:rPr lang="pl-PL" dirty="0" smtClean="0">
+                <a:latin typeface="Lucida Console" pitchFamily="49" charset="0"/>
+              </a:rPr>
+              <a:t>();</a:t>
+            </a:r>
+          </a:p>
+          <a:p>
+            <a:pPr lvl="1"/>
             <a:endParaRPr lang="pl-PL" dirty="0">
               <a:latin typeface="Lucida Console" pitchFamily="49" charset="0"/>
             </a:endParaRPr>
           </a:p>
+          <a:p>
+            <a:r>
+              <a:rPr lang="pl-PL" dirty="0">
+                <a:latin typeface="Lucida Console" pitchFamily="49" charset="0"/>
+              </a:rPr>
+              <a:t>} </a:t>
+            </a:r>
+            <a:r>
+              <a:rPr lang="pl-PL" dirty="0" err="1">
+                <a:latin typeface="Lucida Console" pitchFamily="49" charset="0"/>
+              </a:rPr>
+              <a:t>finally</a:t>
+            </a:r>
+            <a:r>
+              <a:rPr lang="pl-PL" dirty="0">
+                <a:latin typeface="Lucida Console" pitchFamily="49" charset="0"/>
+              </a:rPr>
+              <a:t> {</a:t>
+            </a:r>
+          </a:p>
+          <a:p>
+            <a:pPr lvl="1"/>
+            <a:r>
+              <a:rPr lang="pl-PL" dirty="0" smtClean="0">
+                <a:latin typeface="Lucida Console" pitchFamily="49" charset="0"/>
+              </a:rPr>
+              <a:t>	</a:t>
+            </a:r>
+            <a:r>
+              <a:rPr lang="pl-PL" dirty="0" err="1" smtClean="0">
+                <a:latin typeface="Lucida Console" pitchFamily="49" charset="0"/>
+              </a:rPr>
+              <a:t>session.flush</a:t>
+            </a:r>
+            <a:r>
+              <a:rPr lang="pl-PL" dirty="0">
+                <a:latin typeface="Lucida Console" pitchFamily="49" charset="0"/>
+              </a:rPr>
+              <a:t>();</a:t>
+            </a:r>
+          </a:p>
+          <a:p>
+            <a:pPr lvl="1"/>
+            <a:r>
+              <a:rPr lang="pl-PL" dirty="0" smtClean="0">
+                <a:latin typeface="Lucida Console" pitchFamily="49" charset="0"/>
+              </a:rPr>
+              <a:t>	</a:t>
+            </a:r>
+            <a:r>
+              <a:rPr lang="pl-PL" dirty="0" err="1" smtClean="0">
+                <a:latin typeface="Lucida Console" pitchFamily="49" charset="0"/>
+              </a:rPr>
+              <a:t>session.close</a:t>
+            </a:r>
+            <a:r>
+              <a:rPr lang="pl-PL" dirty="0">
+                <a:latin typeface="Lucida Console" pitchFamily="49" charset="0"/>
+              </a:rPr>
+              <a:t>();</a:t>
+            </a:r>
+          </a:p>
+          <a:p>
+            <a:r>
+              <a:rPr lang="pl-PL" dirty="0">
+                <a:latin typeface="Lucida Console" pitchFamily="49" charset="0"/>
+              </a:rPr>
+              <a:t>}</a:t>
+            </a:r>
+            <a:endParaRPr lang="pl-PL" dirty="0">
+              <a:latin typeface="Lucida Console" pitchFamily="49" charset="0"/>
+            </a:endParaRPr>
+          </a:p>
         </p:txBody>
       </p:sp>
     </p:spTree>
     <p:extLst>
       <p:ext uri="{BB962C8B-B14F-4D97-AF65-F5344CB8AC3E}">
-        <p14:creationId xmlns:p14="http://schemas.microsoft.com/office/powerpoint/2010/main" val="334467706"/>
+        <p14:creationId xmlns:p14="http://schemas.microsoft.com/office/powerpoint/2010/main" val="1573387188"/>
       </p:ext>
     </p:extLst>
   </p:cSld>
@@ -8289,11 +8194,11 @@
           <a:p>
             <a:r>
               <a:rPr lang="pl-PL" dirty="0" err="1" smtClean="0"/>
-              <a:t>Hibernate</a:t>
+              <a:t>Create</a:t>
             </a:r>
             <a:r>
               <a:rPr lang="pl-PL" dirty="0" smtClean="0"/>
-              <a:t> – dostęp do bazy</a:t>
+              <a:t>…</a:t>
             </a:r>
             <a:endParaRPr lang="pl-PL" dirty="0"/>
           </a:p>
@@ -8301,31 +8206,145 @@
       </p:sp>
       <p:sp>
         <p:nvSpPr>
-          <p:cNvPr id="3" name="Symbol zastępczy zawartości 2"/>
-          <p:cNvSpPr>
-            <a:spLocks noGrp="1"/>
-          </p:cNvSpPr>
-          <p:nvPr>
-            <p:ph idx="1"/>
-          </p:nvPr>
-        </p:nvSpPr>
-        <p:spPr/>
-        <p:txBody>
-          <a:bodyPr/>
+          <p:cNvPr id="4" name="Prostokąt 3"/>
+          <p:cNvSpPr/>
+          <p:nvPr/>
+        </p:nvSpPr>
+        <p:spPr>
+          <a:xfrm>
+            <a:off x="323528" y="2001029"/>
+            <a:ext cx="8820472" cy="2308324"/>
+          </a:xfrm>
+          <a:prstGeom prst="rect">
+            <a:avLst/>
+          </a:prstGeom>
+        </p:spPr>
+        <p:txBody>
+          <a:bodyPr wrap="square">
+            <a:spAutoFit/>
+          </a:bodyPr>
           <a:lstStyle/>
           <a:p>
             <a:r>
-              <a:rPr lang="pl-PL" dirty="0" smtClean="0"/>
-              <a:t>Obsługa relacji</a:t>
-            </a:r>
-            <a:endParaRPr lang="pl-PL" dirty="0"/>
+              <a:rPr lang="en-US" dirty="0">
+                <a:latin typeface="Lucida Console" pitchFamily="49" charset="0"/>
+              </a:rPr>
+              <a:t>Customer c = new Customer("AXAMI", "</a:t>
+            </a:r>
+            <a:r>
+              <a:rPr lang="en-US" dirty="0" err="1">
+                <a:latin typeface="Lucida Console" pitchFamily="49" charset="0"/>
+              </a:rPr>
+              <a:t>Aksamit</a:t>
+            </a:r>
+            <a:r>
+              <a:rPr lang="en-US" dirty="0">
+                <a:latin typeface="Lucida Console" pitchFamily="49" charset="0"/>
+              </a:rPr>
+              <a:t> INC.");</a:t>
+            </a:r>
+          </a:p>
+          <a:p>
+            <a:r>
+              <a:rPr lang="pl-PL" dirty="0" err="1">
+                <a:latin typeface="Lucida Console" pitchFamily="49" charset="0"/>
+              </a:rPr>
+              <a:t>session.save</a:t>
+            </a:r>
+            <a:r>
+              <a:rPr lang="pl-PL" dirty="0">
+                <a:latin typeface="Lucida Console" pitchFamily="49" charset="0"/>
+              </a:rPr>
+              <a:t>(c);</a:t>
+            </a:r>
+          </a:p>
+          <a:p>
+            <a:endParaRPr lang="pl-PL" dirty="0">
+              <a:latin typeface="Lucida Console" pitchFamily="49" charset="0"/>
+            </a:endParaRPr>
+          </a:p>
+          <a:p>
+            <a:r>
+              <a:rPr lang="en-US" dirty="0">
+                <a:latin typeface="Lucida Console" pitchFamily="49" charset="0"/>
+              </a:rPr>
+              <a:t>Employee e = new Employee("</a:t>
+            </a:r>
+            <a:r>
+              <a:rPr lang="en-US" dirty="0" err="1">
+                <a:latin typeface="Lucida Console" pitchFamily="49" charset="0"/>
+              </a:rPr>
+              <a:t>Alicja</a:t>
+            </a:r>
+            <a:r>
+              <a:rPr lang="en-US" dirty="0">
+                <a:latin typeface="Lucida Console" pitchFamily="49" charset="0"/>
+              </a:rPr>
+              <a:t>", "</a:t>
+            </a:r>
+            <a:r>
+              <a:rPr lang="en-US" dirty="0" err="1">
+                <a:latin typeface="Lucida Console" pitchFamily="49" charset="0"/>
+              </a:rPr>
+              <a:t>Salamon</a:t>
+            </a:r>
+            <a:r>
+              <a:rPr lang="en-US" dirty="0">
+                <a:latin typeface="Lucida Console" pitchFamily="49" charset="0"/>
+              </a:rPr>
+              <a:t>", "Krakow");</a:t>
+            </a:r>
+          </a:p>
+          <a:p>
+            <a:r>
+              <a:rPr lang="pl-PL" dirty="0" err="1">
+                <a:latin typeface="Lucida Console" pitchFamily="49" charset="0"/>
+              </a:rPr>
+              <a:t>session.save</a:t>
+            </a:r>
+            <a:r>
+              <a:rPr lang="pl-PL" dirty="0">
+                <a:latin typeface="Lucida Console" pitchFamily="49" charset="0"/>
+              </a:rPr>
+              <a:t>(e);</a:t>
+            </a:r>
+          </a:p>
+          <a:p>
+            <a:endParaRPr lang="pl-PL" dirty="0">
+              <a:latin typeface="Lucida Console" pitchFamily="49" charset="0"/>
+            </a:endParaRPr>
+          </a:p>
+          <a:p>
+            <a:r>
+              <a:rPr lang="en-US" dirty="0">
+                <a:latin typeface="Lucida Console" pitchFamily="49" charset="0"/>
+              </a:rPr>
+              <a:t>Order o = new Order(e, c);</a:t>
+            </a:r>
+          </a:p>
+          <a:p>
+            <a:r>
+              <a:rPr lang="pl-PL" dirty="0" err="1">
+                <a:latin typeface="Lucida Console" pitchFamily="49" charset="0"/>
+              </a:rPr>
+              <a:t>session.save</a:t>
+            </a:r>
+            <a:r>
+              <a:rPr lang="pl-PL" dirty="0">
+                <a:latin typeface="Lucida Console" pitchFamily="49" charset="0"/>
+              </a:rPr>
+              <a:t>(o);</a:t>
+            </a:r>
+            <a:endParaRPr lang="pl-PL" dirty="0">
+              <a:latin typeface="Lucida Console" pitchFamily="49" charset="0"/>
+            </a:endParaRPr>
           </a:p>
         </p:txBody>
       </p:sp>
     </p:spTree>
     <p:extLst>
       <p:ext uri="{BB962C8B-B14F-4D97-AF65-F5344CB8AC3E}">
-        <p14:creationId xmlns:p14="http://schemas.microsoft.com/office/powerpoint/2010/main" val="3056722092"/>
+        <p14:creationId xmlns:p14="http://schemas.microsoft.com/office/powerpoint/2010/main" val="4222481412"/>
       </p:ext>
     </p:extLst>
   </p:cSld>
@@ -8368,12 +8387,8 @@
           <a:lstStyle/>
           <a:p>
             <a:r>
-              <a:rPr lang="pl-PL" dirty="0" err="1" smtClean="0"/>
-              <a:t>Hibernate</a:t>
-            </a:r>
-            <a:r>
               <a:rPr lang="pl-PL" dirty="0" smtClean="0"/>
-              <a:t> – dostęp do bazy</a:t>
+              <a:t>Read…</a:t>
             </a:r>
             <a:endParaRPr lang="pl-PL" dirty="0"/>
           </a:p>
@@ -8381,31 +8396,393 @@
       </p:sp>
       <p:sp>
         <p:nvSpPr>
-          <p:cNvPr id="3" name="Symbol zastępczy zawartości 2"/>
-          <p:cNvSpPr>
-            <a:spLocks noGrp="1"/>
-          </p:cNvSpPr>
-          <p:nvPr>
-            <p:ph idx="1"/>
-          </p:nvPr>
-        </p:nvSpPr>
-        <p:spPr/>
-        <p:txBody>
-          <a:bodyPr/>
+          <p:cNvPr id="4" name="Prostokąt 3"/>
+          <p:cNvSpPr/>
+          <p:nvPr/>
+        </p:nvSpPr>
+        <p:spPr>
+          <a:xfrm>
+            <a:off x="273665" y="1700808"/>
+            <a:ext cx="8496944" cy="3354765"/>
+          </a:xfrm>
+          <a:prstGeom prst="rect">
+            <a:avLst/>
+          </a:prstGeom>
+        </p:spPr>
+        <p:txBody>
+          <a:bodyPr wrap="square">
+            <a:spAutoFit/>
+          </a:bodyPr>
           <a:lstStyle/>
           <a:p>
             <a:r>
-              <a:rPr lang="pl-PL" dirty="0" smtClean="0"/>
-              <a:t>Obsługa transakcji</a:t>
-            </a:r>
-            <a:endParaRPr lang="pl-PL" dirty="0"/>
+              <a:rPr lang="pl-PL" sz="1600" dirty="0">
+                <a:latin typeface="Lucida Console" pitchFamily="49" charset="0"/>
+              </a:rPr>
+              <a:t>List&lt;Order&gt; </a:t>
+            </a:r>
+            <a:r>
+              <a:rPr lang="pl-PL" sz="1600" dirty="0" err="1">
+                <a:latin typeface="Lucida Console" pitchFamily="49" charset="0"/>
+              </a:rPr>
+              <a:t>ordersList</a:t>
+            </a:r>
+            <a:r>
+              <a:rPr lang="pl-PL" sz="1600" dirty="0">
+                <a:latin typeface="Lucida Console" pitchFamily="49" charset="0"/>
+              </a:rPr>
+              <a:t> = </a:t>
+            </a:r>
+            <a:r>
+              <a:rPr lang="pl-PL" sz="1600" dirty="0" err="1">
+                <a:latin typeface="Lucida Console" pitchFamily="49" charset="0"/>
+              </a:rPr>
+              <a:t>newSession</a:t>
+            </a:r>
+            <a:endParaRPr lang="pl-PL" sz="1600" dirty="0">
+              <a:latin typeface="Lucida Console" pitchFamily="49" charset="0"/>
+            </a:endParaRPr>
+          </a:p>
+          <a:p>
+            <a:r>
+              <a:rPr lang="en-US" sz="1600" dirty="0">
+                <a:latin typeface="Lucida Console" pitchFamily="49" charset="0"/>
+              </a:rPr>
+              <a:t>.</a:t>
+            </a:r>
+            <a:r>
+              <a:rPr lang="en-US" sz="1600" dirty="0" err="1">
+                <a:latin typeface="Lucida Console" pitchFamily="49" charset="0"/>
+              </a:rPr>
+              <a:t>createSQLQuery</a:t>
+            </a:r>
+            <a:r>
+              <a:rPr lang="en-US" sz="1600" dirty="0">
+                <a:latin typeface="Lucida Console" pitchFamily="49" charset="0"/>
+              </a:rPr>
+              <a:t>("select * from Orders where </a:t>
+            </a:r>
+            <a:r>
+              <a:rPr lang="en-US" sz="1600" dirty="0" err="1">
+                <a:latin typeface="Lucida Console" pitchFamily="49" charset="0"/>
+              </a:rPr>
+              <a:t>OrderID</a:t>
+            </a:r>
+            <a:r>
+              <a:rPr lang="en-US" sz="1600" dirty="0">
+                <a:latin typeface="Lucida Console" pitchFamily="49" charset="0"/>
+              </a:rPr>
+              <a:t>=11078")</a:t>
+            </a:r>
+          </a:p>
+          <a:p>
+            <a:r>
+              <a:rPr lang="pl-PL" sz="1600" dirty="0">
+                <a:latin typeface="Lucida Console" pitchFamily="49" charset="0"/>
+              </a:rPr>
+              <a:t>.</a:t>
+            </a:r>
+            <a:r>
+              <a:rPr lang="pl-PL" sz="1600" dirty="0" err="1">
+                <a:latin typeface="Lucida Console" pitchFamily="49" charset="0"/>
+              </a:rPr>
+              <a:t>addEntity</a:t>
+            </a:r>
+            <a:r>
+              <a:rPr lang="pl-PL" sz="1600" dirty="0">
+                <a:latin typeface="Lucida Console" pitchFamily="49" charset="0"/>
+              </a:rPr>
+              <a:t>(</a:t>
+            </a:r>
+            <a:r>
+              <a:rPr lang="pl-PL" sz="1600" dirty="0" err="1">
+                <a:latin typeface="Lucida Console" pitchFamily="49" charset="0"/>
+              </a:rPr>
+              <a:t>Order.class</a:t>
+            </a:r>
+            <a:r>
+              <a:rPr lang="pl-PL" sz="1600" dirty="0">
+                <a:latin typeface="Lucida Console" pitchFamily="49" charset="0"/>
+              </a:rPr>
+              <a:t>).list();</a:t>
+            </a:r>
+          </a:p>
+          <a:p>
+            <a:endParaRPr lang="pl-PL" sz="1600" dirty="0">
+              <a:latin typeface="Lucida Console" pitchFamily="49" charset="0"/>
+            </a:endParaRPr>
+          </a:p>
+          <a:p>
+            <a:r>
+              <a:rPr lang="pl-PL" sz="1600" dirty="0">
+                <a:latin typeface="Lucida Console" pitchFamily="49" charset="0"/>
+              </a:rPr>
+              <a:t>for (</a:t>
+            </a:r>
+            <a:r>
+              <a:rPr lang="pl-PL" sz="1600" dirty="0" err="1">
+                <a:latin typeface="Lucida Console" pitchFamily="49" charset="0"/>
+              </a:rPr>
+              <a:t>Iterator</a:t>
+            </a:r>
+            <a:r>
+              <a:rPr lang="pl-PL" sz="1600" dirty="0">
+                <a:latin typeface="Lucida Console" pitchFamily="49" charset="0"/>
+              </a:rPr>
+              <a:t>&lt;Order&gt; </a:t>
+            </a:r>
+            <a:r>
+              <a:rPr lang="pl-PL" sz="1600" dirty="0" err="1">
+                <a:latin typeface="Lucida Console" pitchFamily="49" charset="0"/>
+              </a:rPr>
+              <a:t>iter</a:t>
+            </a:r>
+            <a:r>
+              <a:rPr lang="pl-PL" sz="1600" dirty="0">
+                <a:latin typeface="Lucida Console" pitchFamily="49" charset="0"/>
+              </a:rPr>
+              <a:t> = </a:t>
+            </a:r>
+            <a:r>
+              <a:rPr lang="pl-PL" sz="1600" dirty="0" err="1">
+                <a:latin typeface="Lucida Console" pitchFamily="49" charset="0"/>
+              </a:rPr>
+              <a:t>ordersList.iterator</a:t>
+            </a:r>
+            <a:r>
+              <a:rPr lang="pl-PL" sz="1600" dirty="0">
+                <a:latin typeface="Lucida Console" pitchFamily="49" charset="0"/>
+              </a:rPr>
+              <a:t>(); </a:t>
+            </a:r>
+            <a:r>
+              <a:rPr lang="pl-PL" sz="1600" dirty="0" err="1">
+                <a:latin typeface="Lucida Console" pitchFamily="49" charset="0"/>
+              </a:rPr>
+              <a:t>iter.hasNext</a:t>
+            </a:r>
+            <a:r>
+              <a:rPr lang="pl-PL" sz="1600" dirty="0">
+                <a:latin typeface="Lucida Console" pitchFamily="49" charset="0"/>
+              </a:rPr>
+              <a:t>();) {</a:t>
+            </a:r>
+          </a:p>
+          <a:p>
+            <a:pPr lvl="1"/>
+            <a:r>
+              <a:rPr lang="pl-PL" sz="1600" dirty="0">
+                <a:latin typeface="Lucida Console" pitchFamily="49" charset="0"/>
+              </a:rPr>
+              <a:t>Order </a:t>
+            </a:r>
+            <a:r>
+              <a:rPr lang="pl-PL" sz="1600" dirty="0" err="1">
+                <a:latin typeface="Lucida Console" pitchFamily="49" charset="0"/>
+              </a:rPr>
+              <a:t>order</a:t>
+            </a:r>
+            <a:r>
+              <a:rPr lang="pl-PL" sz="1600" dirty="0">
+                <a:latin typeface="Lucida Console" pitchFamily="49" charset="0"/>
+              </a:rPr>
+              <a:t> = (Order) </a:t>
+            </a:r>
+            <a:r>
+              <a:rPr lang="pl-PL" sz="1600" dirty="0" err="1">
+                <a:latin typeface="Lucida Console" pitchFamily="49" charset="0"/>
+              </a:rPr>
+              <a:t>iter.next</a:t>
+            </a:r>
+            <a:r>
+              <a:rPr lang="pl-PL" sz="1600" dirty="0">
+                <a:latin typeface="Lucida Console" pitchFamily="49" charset="0"/>
+              </a:rPr>
+              <a:t>();</a:t>
+            </a:r>
+          </a:p>
+          <a:p>
+            <a:pPr lvl="1"/>
+            <a:r>
+              <a:rPr lang="pl-PL" sz="1600" dirty="0" err="1">
+                <a:latin typeface="Lucida Console" pitchFamily="49" charset="0"/>
+              </a:rPr>
+              <a:t>Employee</a:t>
+            </a:r>
+            <a:r>
+              <a:rPr lang="pl-PL" sz="1600" dirty="0">
+                <a:latin typeface="Lucida Console" pitchFamily="49" charset="0"/>
+              </a:rPr>
+              <a:t> </a:t>
+            </a:r>
+            <a:r>
+              <a:rPr lang="pl-PL" sz="1600" dirty="0" err="1">
+                <a:latin typeface="Lucida Console" pitchFamily="49" charset="0"/>
+              </a:rPr>
+              <a:t>empl</a:t>
+            </a:r>
+            <a:r>
+              <a:rPr lang="pl-PL" sz="1600" dirty="0">
+                <a:latin typeface="Lucida Console" pitchFamily="49" charset="0"/>
+              </a:rPr>
+              <a:t> = </a:t>
+            </a:r>
+            <a:r>
+              <a:rPr lang="pl-PL" sz="1600" dirty="0" err="1">
+                <a:latin typeface="Lucida Console" pitchFamily="49" charset="0"/>
+              </a:rPr>
+              <a:t>order.getEmployeeID</a:t>
+            </a:r>
+            <a:r>
+              <a:rPr lang="pl-PL" sz="1600" dirty="0">
+                <a:latin typeface="Lucida Console" pitchFamily="49" charset="0"/>
+              </a:rPr>
+              <a:t>();</a:t>
+            </a:r>
+          </a:p>
+          <a:p>
+            <a:pPr lvl="1"/>
+            <a:r>
+              <a:rPr lang="pl-PL" sz="1600" dirty="0" err="1">
+                <a:latin typeface="Lucida Console" pitchFamily="49" charset="0"/>
+              </a:rPr>
+              <a:t>Customer</a:t>
+            </a:r>
+            <a:r>
+              <a:rPr lang="pl-PL" sz="1600" dirty="0">
+                <a:latin typeface="Lucida Console" pitchFamily="49" charset="0"/>
+              </a:rPr>
+              <a:t> </a:t>
+            </a:r>
+            <a:r>
+              <a:rPr lang="pl-PL" sz="1600" dirty="0" err="1">
+                <a:latin typeface="Lucida Console" pitchFamily="49" charset="0"/>
+              </a:rPr>
+              <a:t>cust</a:t>
+            </a:r>
+            <a:r>
+              <a:rPr lang="pl-PL" sz="1600" dirty="0">
+                <a:latin typeface="Lucida Console" pitchFamily="49" charset="0"/>
+              </a:rPr>
+              <a:t> = </a:t>
+            </a:r>
+            <a:r>
+              <a:rPr lang="pl-PL" sz="1600" dirty="0" err="1">
+                <a:latin typeface="Lucida Console" pitchFamily="49" charset="0"/>
+              </a:rPr>
+              <a:t>order.getCustomerID</a:t>
+            </a:r>
+            <a:r>
+              <a:rPr lang="pl-PL" sz="1600" dirty="0">
+                <a:latin typeface="Lucida Console" pitchFamily="49" charset="0"/>
+              </a:rPr>
+              <a:t>();</a:t>
+            </a:r>
+          </a:p>
+          <a:p>
+            <a:pPr lvl="1"/>
+            <a:r>
+              <a:rPr lang="pl-PL" sz="1600" dirty="0" err="1">
+                <a:latin typeface="Lucida Console" pitchFamily="49" charset="0"/>
+              </a:rPr>
+              <a:t>System.</a:t>
+            </a:r>
+            <a:r>
+              <a:rPr lang="pl-PL" sz="1600" i="1" dirty="0" err="1">
+                <a:latin typeface="Lucida Console" pitchFamily="49" charset="0"/>
+              </a:rPr>
+              <a:t>out.println</a:t>
+            </a:r>
+            <a:r>
+              <a:rPr lang="pl-PL" sz="1600" i="1" dirty="0">
+                <a:latin typeface="Lucida Console" pitchFamily="49" charset="0"/>
+              </a:rPr>
+              <a:t>(</a:t>
+            </a:r>
+            <a:r>
+              <a:rPr lang="pl-PL" sz="1600" i="1" dirty="0" err="1">
+                <a:latin typeface="Lucida Console" pitchFamily="49" charset="0"/>
+              </a:rPr>
+              <a:t>order.getOrderID</a:t>
+            </a:r>
+            <a:r>
+              <a:rPr lang="pl-PL" sz="1600" i="1" dirty="0">
+                <a:latin typeface="Lucida Console" pitchFamily="49" charset="0"/>
+              </a:rPr>
+              <a:t>() + " by "</a:t>
+            </a:r>
+          </a:p>
+          <a:p>
+            <a:pPr lvl="2"/>
+            <a:r>
+              <a:rPr lang="pl-PL" sz="1600" dirty="0">
+                <a:latin typeface="Lucida Console" pitchFamily="49" charset="0"/>
+              </a:rPr>
+              <a:t>+ </a:t>
+            </a:r>
+            <a:r>
+              <a:rPr lang="pl-PL" sz="1600" dirty="0" err="1">
+                <a:latin typeface="Lucida Console" pitchFamily="49" charset="0"/>
+              </a:rPr>
+              <a:t>empl.getFirstName</a:t>
+            </a:r>
+            <a:r>
+              <a:rPr lang="pl-PL" sz="1600" dirty="0">
+                <a:latin typeface="Lucida Console" pitchFamily="49" charset="0"/>
+              </a:rPr>
+              <a:t>() + " " + </a:t>
+            </a:r>
+            <a:r>
+              <a:rPr lang="pl-PL" sz="1600" dirty="0" err="1">
+                <a:latin typeface="Lucida Console" pitchFamily="49" charset="0"/>
+              </a:rPr>
+              <a:t>empl.getLastName</a:t>
+            </a:r>
+            <a:r>
+              <a:rPr lang="pl-PL" sz="1600" dirty="0">
+                <a:latin typeface="Lucida Console" pitchFamily="49" charset="0"/>
+              </a:rPr>
+              <a:t>() + " for "</a:t>
+            </a:r>
+          </a:p>
+          <a:p>
+            <a:pPr lvl="2"/>
+            <a:r>
+              <a:rPr lang="pl-PL" sz="1600" dirty="0">
+                <a:latin typeface="Lucida Console" pitchFamily="49" charset="0"/>
+              </a:rPr>
+              <a:t>+ </a:t>
+            </a:r>
+            <a:r>
+              <a:rPr lang="pl-PL" sz="1600" dirty="0" err="1">
+                <a:latin typeface="Lucida Console" pitchFamily="49" charset="0"/>
+              </a:rPr>
+              <a:t>cust.getCompanyName</a:t>
+            </a:r>
+            <a:r>
+              <a:rPr lang="pl-PL" sz="1600" dirty="0">
+                <a:latin typeface="Lucida Console" pitchFamily="49" charset="0"/>
+              </a:rPr>
+              <a:t>());</a:t>
+            </a:r>
+          </a:p>
+          <a:p>
+            <a:r>
+              <a:rPr lang="pl-PL" sz="1600" dirty="0">
+                <a:latin typeface="Lucida Console" pitchFamily="49" charset="0"/>
+              </a:rPr>
+              <a:t>}</a:t>
+            </a:r>
+            <a:endParaRPr lang="pl-PL" sz="1600" dirty="0">
+              <a:latin typeface="Lucida Console" pitchFamily="49" charset="0"/>
+            </a:endParaRPr>
           </a:p>
         </p:txBody>
       </p:sp>
     </p:spTree>
     <p:extLst>
       <p:ext uri="{BB962C8B-B14F-4D97-AF65-F5344CB8AC3E}">
-        <p14:creationId xmlns:p14="http://schemas.microsoft.com/office/powerpoint/2010/main" val="1573387188"/>
+        <p14:creationId xmlns:p14="http://schemas.microsoft.com/office/powerpoint/2010/main" val="1389485315"/>
       </p:ext>
     </p:extLst>
   </p:cSld>
@@ -8416,6 +8793,561 @@
 </file>
 
 <file path=ppt/slides/slide25.xml><?xml version="1.0" encoding="utf-8"?>
+<p:sld xmlns:a="http://schemas.openxmlformats.org/drawingml/2006/main" xmlns:r="http://schemas.openxmlformats.org/officeDocument/2006/relationships" xmlns:p="http://schemas.openxmlformats.org/presentationml/2006/main">
+  <p:cSld>
+    <p:spTree>
+      <p:nvGrpSpPr>
+        <p:cNvPr id="1" name=""/>
+        <p:cNvGrpSpPr/>
+        <p:nvPr/>
+      </p:nvGrpSpPr>
+      <p:grpSpPr>
+        <a:xfrm>
+          <a:off x="0" y="0"/>
+          <a:ext cx="0" cy="0"/>
+          <a:chOff x="0" y="0"/>
+          <a:chExt cx="0" cy="0"/>
+        </a:xfrm>
+      </p:grpSpPr>
+      <p:sp>
+        <p:nvSpPr>
+          <p:cNvPr id="2" name="Tytuł 1"/>
+          <p:cNvSpPr>
+            <a:spLocks noGrp="1"/>
+          </p:cNvSpPr>
+          <p:nvPr>
+            <p:ph type="title"/>
+          </p:nvPr>
+        </p:nvSpPr>
+        <p:spPr/>
+        <p:txBody>
+          <a:bodyPr/>
+          <a:lstStyle/>
+          <a:p>
+            <a:r>
+              <a:rPr lang="pl-PL" dirty="0" smtClean="0"/>
+              <a:t>Update…</a:t>
+            </a:r>
+            <a:endParaRPr lang="pl-PL" dirty="0"/>
+          </a:p>
+        </p:txBody>
+      </p:sp>
+      <p:sp>
+        <p:nvSpPr>
+          <p:cNvPr id="4" name="Prostokąt 3"/>
+          <p:cNvSpPr/>
+          <p:nvPr/>
+        </p:nvSpPr>
+        <p:spPr>
+          <a:xfrm>
+            <a:off x="539552" y="2228671"/>
+            <a:ext cx="7776864" cy="2585323"/>
+          </a:xfrm>
+          <a:prstGeom prst="rect">
+            <a:avLst/>
+          </a:prstGeom>
+        </p:spPr>
+        <p:txBody>
+          <a:bodyPr wrap="square">
+            <a:spAutoFit/>
+          </a:bodyPr>
+          <a:lstStyle/>
+          <a:p>
+            <a:r>
+              <a:rPr lang="pl-PL" dirty="0" err="1">
+                <a:latin typeface="Lucida Console" pitchFamily="49" charset="0"/>
+              </a:rPr>
+              <a:t>Customer</a:t>
+            </a:r>
+            <a:r>
+              <a:rPr lang="pl-PL" dirty="0">
+                <a:latin typeface="Lucida Console" pitchFamily="49" charset="0"/>
+              </a:rPr>
+              <a:t> c = </a:t>
+            </a:r>
+            <a:r>
+              <a:rPr lang="pl-PL" dirty="0" err="1">
+                <a:latin typeface="Lucida Console" pitchFamily="49" charset="0"/>
+              </a:rPr>
+              <a:t>new</a:t>
+            </a:r>
+            <a:r>
+              <a:rPr lang="pl-PL" dirty="0">
+                <a:latin typeface="Lucida Console" pitchFamily="49" charset="0"/>
+              </a:rPr>
+              <a:t> </a:t>
+            </a:r>
+            <a:r>
+              <a:rPr lang="pl-PL" dirty="0" err="1">
+                <a:latin typeface="Lucida Console" pitchFamily="49" charset="0"/>
+              </a:rPr>
+              <a:t>Customer</a:t>
+            </a:r>
+            <a:r>
+              <a:rPr lang="pl-PL" dirty="0">
+                <a:latin typeface="Lucida Console" pitchFamily="49" charset="0"/>
+              </a:rPr>
+              <a:t>();</a:t>
+            </a:r>
+          </a:p>
+          <a:p>
+            <a:r>
+              <a:rPr lang="pl-PL" dirty="0" err="1">
+                <a:latin typeface="Lucida Console" pitchFamily="49" charset="0"/>
+              </a:rPr>
+              <a:t>c.customerID</a:t>
+            </a:r>
+            <a:r>
+              <a:rPr lang="pl-PL" dirty="0">
+                <a:latin typeface="Lucida Console" pitchFamily="49" charset="0"/>
+              </a:rPr>
+              <a:t> = </a:t>
+            </a:r>
+            <a:r>
+              <a:rPr lang="pl-PL" dirty="0" smtClean="0">
+                <a:latin typeface="Lucida Console" pitchFamily="49" charset="0"/>
+              </a:rPr>
+              <a:t>„SCINC";</a:t>
+            </a:r>
+            <a:endParaRPr lang="pl-PL" dirty="0">
+              <a:latin typeface="Lucida Console" pitchFamily="49" charset="0"/>
+            </a:endParaRPr>
+          </a:p>
+          <a:p>
+            <a:r>
+              <a:rPr lang="pl-PL" dirty="0" err="1">
+                <a:latin typeface="Lucida Console" pitchFamily="49" charset="0"/>
+              </a:rPr>
+              <a:t>c.companyName</a:t>
+            </a:r>
+            <a:r>
+              <a:rPr lang="pl-PL" dirty="0">
+                <a:latin typeface="Lucida Console" pitchFamily="49" charset="0"/>
+              </a:rPr>
+              <a:t> = </a:t>
+            </a:r>
+            <a:r>
+              <a:rPr lang="pl-PL" dirty="0" smtClean="0">
+                <a:latin typeface="Lucida Console" pitchFamily="49" charset="0"/>
+              </a:rPr>
+              <a:t>„</a:t>
+            </a:r>
+            <a:r>
+              <a:rPr lang="pl-PL" dirty="0" err="1" smtClean="0">
+                <a:latin typeface="Lucida Console" pitchFamily="49" charset="0"/>
+              </a:rPr>
+              <a:t>SomeCompany</a:t>
+            </a:r>
+            <a:r>
+              <a:rPr lang="pl-PL" dirty="0" smtClean="0">
+                <a:latin typeface="Lucida Console" pitchFamily="49" charset="0"/>
+              </a:rPr>
+              <a:t> INC";</a:t>
+            </a:r>
+            <a:endParaRPr lang="pl-PL" dirty="0">
+              <a:latin typeface="Lucida Console" pitchFamily="49" charset="0"/>
+            </a:endParaRPr>
+          </a:p>
+          <a:p>
+            <a:r>
+              <a:rPr lang="pl-PL" dirty="0" err="1">
+                <a:latin typeface="Lucida Console" pitchFamily="49" charset="0"/>
+              </a:rPr>
+              <a:t>session.update</a:t>
+            </a:r>
+            <a:r>
+              <a:rPr lang="pl-PL" dirty="0">
+                <a:latin typeface="Lucida Console" pitchFamily="49" charset="0"/>
+              </a:rPr>
+              <a:t>(c</a:t>
+            </a:r>
+            <a:r>
+              <a:rPr lang="pl-PL" dirty="0" smtClean="0">
+                <a:latin typeface="Lucida Console" pitchFamily="49" charset="0"/>
+              </a:rPr>
+              <a:t>);</a:t>
+            </a:r>
+          </a:p>
+          <a:p>
+            <a:endParaRPr lang="pl-PL" dirty="0" smtClean="0">
+              <a:latin typeface="Lucida Console" pitchFamily="49" charset="0"/>
+            </a:endParaRPr>
+          </a:p>
+          <a:p>
+            <a:endParaRPr lang="pl-PL" dirty="0"/>
+          </a:p>
+          <a:p>
+            <a:r>
+              <a:rPr lang="en-US" dirty="0">
+                <a:latin typeface="Lucida Console" pitchFamily="49" charset="0"/>
+              </a:rPr>
+              <a:t>Employee e = new Employee</a:t>
+            </a:r>
+            <a:r>
+              <a:rPr lang="en-US" dirty="0" smtClean="0">
+                <a:latin typeface="Lucida Console" pitchFamily="49" charset="0"/>
+              </a:rPr>
+              <a:t>(„</a:t>
+            </a:r>
+            <a:r>
+              <a:rPr lang="pl-PL" dirty="0" smtClean="0">
+                <a:latin typeface="Lucida Console" pitchFamily="49" charset="0"/>
+              </a:rPr>
+              <a:t>Jones</a:t>
+            </a:r>
+            <a:r>
+              <a:rPr lang="en-US" dirty="0" smtClean="0">
+                <a:latin typeface="Lucida Console" pitchFamily="49" charset="0"/>
+              </a:rPr>
+              <a:t>", „</a:t>
+            </a:r>
+            <a:r>
+              <a:rPr lang="pl-PL" dirty="0" smtClean="0">
+                <a:latin typeface="Lucida Console" pitchFamily="49" charset="0"/>
+              </a:rPr>
+              <a:t>John</a:t>
+            </a:r>
+            <a:r>
+              <a:rPr lang="en-US" dirty="0" smtClean="0">
+                <a:latin typeface="Lucida Console" pitchFamily="49" charset="0"/>
+              </a:rPr>
+              <a:t>", „</a:t>
+            </a:r>
+            <a:r>
+              <a:rPr lang="pl-PL" dirty="0" err="1" smtClean="0">
+                <a:latin typeface="Lucida Console" pitchFamily="49" charset="0"/>
+              </a:rPr>
+              <a:t>Warsaw</a:t>
+            </a:r>
+            <a:r>
+              <a:rPr lang="en-US" dirty="0" smtClean="0">
+                <a:latin typeface="Lucida Console" pitchFamily="49" charset="0"/>
+              </a:rPr>
+              <a:t>");</a:t>
+            </a:r>
+            <a:endParaRPr lang="en-US" dirty="0">
+              <a:latin typeface="Lucida Console" pitchFamily="49" charset="0"/>
+            </a:endParaRPr>
+          </a:p>
+          <a:p>
+            <a:r>
+              <a:rPr lang="pl-PL" dirty="0" err="1">
+                <a:latin typeface="Lucida Console" pitchFamily="49" charset="0"/>
+              </a:rPr>
+              <a:t>e.EmployeeID</a:t>
+            </a:r>
+            <a:r>
+              <a:rPr lang="pl-PL" dirty="0">
+                <a:latin typeface="Lucida Console" pitchFamily="49" charset="0"/>
+              </a:rPr>
+              <a:t>=10;</a:t>
+            </a:r>
+          </a:p>
+          <a:p>
+            <a:r>
+              <a:rPr lang="pl-PL" dirty="0" err="1">
+                <a:latin typeface="Lucida Console" pitchFamily="49" charset="0"/>
+              </a:rPr>
+              <a:t>session.update</a:t>
+            </a:r>
+            <a:r>
+              <a:rPr lang="pl-PL" dirty="0">
+                <a:latin typeface="Lucida Console" pitchFamily="49" charset="0"/>
+              </a:rPr>
+              <a:t>(e);</a:t>
+            </a:r>
+          </a:p>
+        </p:txBody>
+      </p:sp>
+    </p:spTree>
+    <p:extLst>
+      <p:ext uri="{BB962C8B-B14F-4D97-AF65-F5344CB8AC3E}">
+        <p14:creationId xmlns:p14="http://schemas.microsoft.com/office/powerpoint/2010/main" val="1526151245"/>
+      </p:ext>
+    </p:extLst>
+  </p:cSld>
+  <p:clrMapOvr>
+    <a:masterClrMapping/>
+  </p:clrMapOvr>
+</p:sld>
+</file>
+
+<file path=ppt/slides/slide26.xml><?xml version="1.0" encoding="utf-8"?>
+<p:sld xmlns:a="http://schemas.openxmlformats.org/drawingml/2006/main" xmlns:r="http://schemas.openxmlformats.org/officeDocument/2006/relationships" xmlns:p="http://schemas.openxmlformats.org/presentationml/2006/main">
+  <p:cSld>
+    <p:spTree>
+      <p:nvGrpSpPr>
+        <p:cNvPr id="1" name=""/>
+        <p:cNvGrpSpPr/>
+        <p:nvPr/>
+      </p:nvGrpSpPr>
+      <p:grpSpPr>
+        <a:xfrm>
+          <a:off x="0" y="0"/>
+          <a:ext cx="0" cy="0"/>
+          <a:chOff x="0" y="0"/>
+          <a:chExt cx="0" cy="0"/>
+        </a:xfrm>
+      </p:grpSpPr>
+      <p:sp>
+        <p:nvSpPr>
+          <p:cNvPr id="2" name="Tytuł 1"/>
+          <p:cNvSpPr>
+            <a:spLocks noGrp="1"/>
+          </p:cNvSpPr>
+          <p:nvPr>
+            <p:ph type="title"/>
+          </p:nvPr>
+        </p:nvSpPr>
+        <p:spPr/>
+        <p:txBody>
+          <a:bodyPr/>
+          <a:lstStyle/>
+          <a:p>
+            <a:r>
+              <a:rPr lang="pl-PL" dirty="0" err="1" smtClean="0"/>
+              <a:t>Delete</a:t>
+            </a:r>
+            <a:r>
+              <a:rPr lang="pl-PL" dirty="0" smtClean="0"/>
+              <a:t>…</a:t>
+            </a:r>
+            <a:endParaRPr lang="pl-PL" dirty="0"/>
+          </a:p>
+        </p:txBody>
+      </p:sp>
+      <p:sp>
+        <p:nvSpPr>
+          <p:cNvPr id="5" name="Prostokąt 4"/>
+          <p:cNvSpPr/>
+          <p:nvPr/>
+        </p:nvSpPr>
+        <p:spPr>
+          <a:xfrm>
+            <a:off x="827584" y="1859340"/>
+            <a:ext cx="6030416" cy="3139321"/>
+          </a:xfrm>
+          <a:prstGeom prst="rect">
+            <a:avLst/>
+          </a:prstGeom>
+        </p:spPr>
+        <p:txBody>
+          <a:bodyPr wrap="square">
+            <a:spAutoFit/>
+          </a:bodyPr>
+          <a:lstStyle/>
+          <a:p>
+            <a:r>
+              <a:rPr lang="pl-PL" dirty="0">
+                <a:latin typeface="Lucida Console" pitchFamily="49" charset="0"/>
+              </a:rPr>
+              <a:t>Order o = </a:t>
+            </a:r>
+            <a:r>
+              <a:rPr lang="pl-PL" dirty="0" err="1">
+                <a:latin typeface="Lucida Console" pitchFamily="49" charset="0"/>
+              </a:rPr>
+              <a:t>new</a:t>
+            </a:r>
+            <a:r>
+              <a:rPr lang="pl-PL" dirty="0">
+                <a:latin typeface="Lucida Console" pitchFamily="49" charset="0"/>
+              </a:rPr>
+              <a:t> Order();</a:t>
+            </a:r>
+          </a:p>
+          <a:p>
+            <a:r>
+              <a:rPr lang="pl-PL" dirty="0" err="1">
+                <a:latin typeface="Lucida Console" pitchFamily="49" charset="0"/>
+              </a:rPr>
+              <a:t>o.setOrderID</a:t>
+            </a:r>
+            <a:r>
+              <a:rPr lang="pl-PL" dirty="0">
+                <a:latin typeface="Lucida Console" pitchFamily="49" charset="0"/>
+              </a:rPr>
+              <a:t>(11078);</a:t>
+            </a:r>
+          </a:p>
+          <a:p>
+            <a:r>
+              <a:rPr lang="pl-PL" dirty="0" err="1">
+                <a:latin typeface="Lucida Console" pitchFamily="49" charset="0"/>
+              </a:rPr>
+              <a:t>session.delete</a:t>
+            </a:r>
+            <a:r>
+              <a:rPr lang="pl-PL" dirty="0">
+                <a:latin typeface="Lucida Console" pitchFamily="49" charset="0"/>
+              </a:rPr>
+              <a:t>(o);</a:t>
+            </a:r>
+          </a:p>
+          <a:p>
+            <a:endParaRPr lang="pl-PL" dirty="0">
+              <a:latin typeface="Lucida Console" pitchFamily="49" charset="0"/>
+            </a:endParaRPr>
+          </a:p>
+          <a:p>
+            <a:r>
+              <a:rPr lang="pl-PL" dirty="0" err="1">
+                <a:latin typeface="Lucida Console" pitchFamily="49" charset="0"/>
+              </a:rPr>
+              <a:t>Customer</a:t>
+            </a:r>
+            <a:r>
+              <a:rPr lang="pl-PL" dirty="0">
+                <a:latin typeface="Lucida Console" pitchFamily="49" charset="0"/>
+              </a:rPr>
+              <a:t> c1 = </a:t>
+            </a:r>
+            <a:r>
+              <a:rPr lang="pl-PL" dirty="0" err="1">
+                <a:latin typeface="Lucida Console" pitchFamily="49" charset="0"/>
+              </a:rPr>
+              <a:t>new</a:t>
+            </a:r>
+            <a:r>
+              <a:rPr lang="pl-PL" dirty="0">
+                <a:latin typeface="Lucida Console" pitchFamily="49" charset="0"/>
+              </a:rPr>
+              <a:t> </a:t>
+            </a:r>
+            <a:r>
+              <a:rPr lang="pl-PL" dirty="0" err="1">
+                <a:latin typeface="Lucida Console" pitchFamily="49" charset="0"/>
+              </a:rPr>
+              <a:t>Customer</a:t>
+            </a:r>
+            <a:r>
+              <a:rPr lang="pl-PL" dirty="0">
+                <a:latin typeface="Lucida Console" pitchFamily="49" charset="0"/>
+              </a:rPr>
+              <a:t>();</a:t>
+            </a:r>
+          </a:p>
+          <a:p>
+            <a:r>
+              <a:rPr lang="pl-PL" dirty="0">
+                <a:latin typeface="Lucida Console" pitchFamily="49" charset="0"/>
+              </a:rPr>
+              <a:t>c1.setCustomerID</a:t>
+            </a:r>
+            <a:r>
+              <a:rPr lang="pl-PL" dirty="0" smtClean="0">
+                <a:latin typeface="Lucida Console" pitchFamily="49" charset="0"/>
+              </a:rPr>
+              <a:t>(„SCINC");</a:t>
+            </a:r>
+            <a:endParaRPr lang="pl-PL" dirty="0">
+              <a:latin typeface="Lucida Console" pitchFamily="49" charset="0"/>
+            </a:endParaRPr>
+          </a:p>
+          <a:p>
+            <a:r>
+              <a:rPr lang="pl-PL" dirty="0" err="1">
+                <a:latin typeface="Lucida Console" pitchFamily="49" charset="0"/>
+              </a:rPr>
+              <a:t>session.delete</a:t>
+            </a:r>
+            <a:r>
+              <a:rPr lang="pl-PL" dirty="0">
+                <a:latin typeface="Lucida Console" pitchFamily="49" charset="0"/>
+              </a:rPr>
+              <a:t>(c1);</a:t>
+            </a:r>
+          </a:p>
+          <a:p>
+            <a:endParaRPr lang="pl-PL" dirty="0">
+              <a:latin typeface="Lucida Console" pitchFamily="49" charset="0"/>
+            </a:endParaRPr>
+          </a:p>
+          <a:p>
+            <a:r>
+              <a:rPr lang="pl-PL" dirty="0" err="1">
+                <a:latin typeface="Lucida Console" pitchFamily="49" charset="0"/>
+              </a:rPr>
+              <a:t>Employee</a:t>
+            </a:r>
+            <a:r>
+              <a:rPr lang="pl-PL" dirty="0">
+                <a:latin typeface="Lucida Console" pitchFamily="49" charset="0"/>
+              </a:rPr>
+              <a:t> e = </a:t>
+            </a:r>
+            <a:r>
+              <a:rPr lang="pl-PL" dirty="0" err="1">
+                <a:latin typeface="Lucida Console" pitchFamily="49" charset="0"/>
+              </a:rPr>
+              <a:t>new</a:t>
+            </a:r>
+            <a:r>
+              <a:rPr lang="pl-PL" dirty="0">
+                <a:latin typeface="Lucida Console" pitchFamily="49" charset="0"/>
+              </a:rPr>
+              <a:t> </a:t>
+            </a:r>
+            <a:r>
+              <a:rPr lang="pl-PL" dirty="0" err="1">
+                <a:latin typeface="Lucida Console" pitchFamily="49" charset="0"/>
+              </a:rPr>
+              <a:t>Employee</a:t>
+            </a:r>
+            <a:r>
+              <a:rPr lang="pl-PL" dirty="0">
+                <a:latin typeface="Lucida Console" pitchFamily="49" charset="0"/>
+              </a:rPr>
+              <a:t>();</a:t>
+            </a:r>
+          </a:p>
+          <a:p>
+            <a:r>
+              <a:rPr lang="pl-PL" dirty="0" err="1">
+                <a:latin typeface="Lucida Console" pitchFamily="49" charset="0"/>
+              </a:rPr>
+              <a:t>e.EmployeeID</a:t>
+            </a:r>
+            <a:r>
+              <a:rPr lang="pl-PL" dirty="0">
+                <a:latin typeface="Lucida Console" pitchFamily="49" charset="0"/>
+              </a:rPr>
+              <a:t> = 10;</a:t>
+            </a:r>
+          </a:p>
+          <a:p>
+            <a:r>
+              <a:rPr lang="pl-PL" dirty="0" err="1">
+                <a:latin typeface="Lucida Console" pitchFamily="49" charset="0"/>
+              </a:rPr>
+              <a:t>session.delete</a:t>
+            </a:r>
+            <a:r>
+              <a:rPr lang="pl-PL" dirty="0">
+                <a:latin typeface="Lucida Console" pitchFamily="49" charset="0"/>
+              </a:rPr>
+              <a:t>(e);</a:t>
+            </a:r>
+            <a:endParaRPr lang="pl-PL" dirty="0">
+              <a:latin typeface="Lucida Console" pitchFamily="49" charset="0"/>
+            </a:endParaRPr>
+          </a:p>
+        </p:txBody>
+      </p:sp>
+    </p:spTree>
+    <p:extLst>
+      <p:ext uri="{BB962C8B-B14F-4D97-AF65-F5344CB8AC3E}">
+        <p14:creationId xmlns:p14="http://schemas.microsoft.com/office/powerpoint/2010/main" val="334467706"/>
+      </p:ext>
+    </p:extLst>
+  </p:cSld>
+  <p:clrMapOvr>
+    <a:masterClrMapping/>
+  </p:clrMapOvr>
+</p:sld>
+</file>
+
+<file path=ppt/slides/slide27.xml><?xml version="1.0" encoding="utf-8"?>
 <p:sld xmlns:a="http://schemas.openxmlformats.org/drawingml/2006/main" xmlns:r="http://schemas.openxmlformats.org/officeDocument/2006/relationships" xmlns:p="http://schemas.openxmlformats.org/presentationml/2006/main">
   <p:cSld>
     <p:spTree>
@@ -8988,7 +9920,11 @@
           <a:p>
             <a:r>
               <a:rPr lang="pl-PL" dirty="0" smtClean="0"/>
-              <a:t>Instalacja MySQL</a:t>
+              <a:t>1. Instalacja </a:t>
+            </a:r>
+            <a:r>
+              <a:rPr lang="pl-PL" dirty="0" smtClean="0"/>
+              <a:t>MySQL</a:t>
             </a:r>
             <a:endParaRPr lang="pl-PL" dirty="0"/>
           </a:p>
@@ -9133,7 +10069,18 @@
           <a:bodyPr/>
           <a:lstStyle/>
           <a:p>
-            <a:endParaRPr lang="pl-PL"/>
+            <a:pPr marL="0" indent="0">
+              <a:buNone/>
+            </a:pPr>
+            <a:r>
+              <a:rPr lang="pl-PL" dirty="0" smtClean="0"/>
+              <a:t>Tu cos od Dawida </a:t>
+            </a:r>
+            <a:r>
+              <a:rPr lang="pl-PL" dirty="0" err="1" smtClean="0"/>
+              <a:t>bedzie</a:t>
+            </a:r>
+            <a:endParaRPr lang="pl-PL" dirty="0"/>
           </a:p>
         </p:txBody>
       </p:sp>
@@ -9184,41 +10131,105 @@
           <a:p>
             <a:r>
               <a:rPr lang="pl-PL" dirty="0" smtClean="0"/>
-              <a:t>Instalacja</a:t>
+              <a:t>2a. Uruchomienie – </a:t>
+            </a:r>
+            <a:r>
+              <a:rPr lang="pl-PL" dirty="0" err="1" smtClean="0"/>
+              <a:t>command</a:t>
+            </a:r>
+            <a:r>
+              <a:rPr lang="pl-PL" dirty="0" smtClean="0"/>
+              <a:t> </a:t>
+            </a:r>
+            <a:r>
+              <a:rPr lang="pl-PL" dirty="0" err="1" smtClean="0"/>
+              <a:t>line</a:t>
             </a:r>
             <a:endParaRPr lang="pl-PL" dirty="0"/>
           </a:p>
         </p:txBody>
       </p:sp>
-      <p:sp>
-        <p:nvSpPr>
-          <p:cNvPr id="3" name="Symbol zastępczy zawartości 2"/>
-          <p:cNvSpPr>
-            <a:spLocks noGrp="1"/>
-          </p:cNvSpPr>
-          <p:nvPr>
-            <p:ph idx="1"/>
-          </p:nvPr>
-        </p:nvSpPr>
-        <p:spPr/>
-        <p:txBody>
-          <a:bodyPr/>
-          <a:lstStyle/>
-          <a:p>
-            <a:endParaRPr lang="pl-PL"/>
-          </a:p>
-        </p:txBody>
-      </p:sp>
+      <p:pic>
+        <p:nvPicPr>
+          <p:cNvPr id="2050" name="Picture 2"/>
+          <p:cNvPicPr>
+            <a:picLocks noChangeAspect="1" noChangeArrowheads="1"/>
+          </p:cNvPicPr>
+          <p:nvPr/>
+        </p:nvPicPr>
+        <p:blipFill>
+          <a:blip r:embed="rId2">
+            <a:extLst>
+              <a:ext uri="{28A0092B-C50C-407E-A947-70E740481C1C}">
+                <a14:useLocalDpi xmlns:a14="http://schemas.microsoft.com/office/drawing/2010/main" val="0"/>
+              </a:ext>
+            </a:extLst>
+          </a:blip>
+          <a:srcRect/>
+          <a:stretch>
+            <a:fillRect/>
+          </a:stretch>
+        </p:blipFill>
+        <p:spPr bwMode="auto">
+          <a:xfrm>
+            <a:off x="-1" y="1700808"/>
+            <a:ext cx="9143933" cy="4617839"/>
+          </a:xfrm>
+          <a:prstGeom prst="rect">
+            <a:avLst/>
+          </a:prstGeom>
+          <a:noFill/>
+          <a:ln>
+            <a:noFill/>
+          </a:ln>
+          <a:effectLst/>
+          <a:extLst>
+            <a:ext uri="{909E8E84-426E-40DD-AFC4-6F175D3DCCD1}">
+              <a14:hiddenFill xmlns:a14="http://schemas.microsoft.com/office/drawing/2010/main">
+                <a:solidFill>
+                  <a:schemeClr val="accent1"/>
+                </a:solidFill>
+              </a14:hiddenFill>
+            </a:ext>
+            <a:ext uri="{91240B29-F687-4F45-9708-019B960494DF}">
+              <a14:hiddenLine xmlns:a14="http://schemas.microsoft.com/office/drawing/2010/main" w="9525">
+                <a:solidFill>
+                  <a:schemeClr val="tx1"/>
+                </a:solidFill>
+                <a:miter lim="800000"/>
+                <a:headEnd/>
+                <a:tailEnd/>
+              </a14:hiddenLine>
+            </a:ext>
+            <a:ext uri="{AF507438-7753-43E0-B8FC-AC1667EBCBE1}">
+              <a14:hiddenEffects xmlns:a14="http://schemas.microsoft.com/office/drawing/2010/main">
+                <a:effectLst>
+                  <a:outerShdw dist="35921" dir="2700000" algn="ctr" rotWithShape="0">
+                    <a:schemeClr val="bg2"/>
+                  </a:outerShdw>
+                </a:effectLst>
+              </a14:hiddenEffects>
+            </a:ext>
+          </a:extLst>
+        </p:spPr>
+      </p:pic>
     </p:spTree>
     <p:extLst>
       <p:ext uri="{BB962C8B-B14F-4D97-AF65-F5344CB8AC3E}">
-        <p14:creationId xmlns:p14="http://schemas.microsoft.com/office/powerpoint/2010/main" val="4065134659"/>
+        <p14:creationId xmlns:p14="http://schemas.microsoft.com/office/powerpoint/2010/main" val="705834278"/>
       </p:ext>
     </p:extLst>
   </p:cSld>
   <p:clrMapOvr>
     <a:masterClrMapping/>
   </p:clrMapOvr>
+  <p:timing>
+    <p:tnLst>
+      <p:par>
+        <p:cTn id="1" dur="indefinite" restart="never" nodeType="tmRoot"/>
+      </p:par>
+    </p:tnLst>
+  </p:timing>
 </p:sld>
 </file>
 
@@ -9256,41 +10267,101 @@
           <a:p>
             <a:r>
               <a:rPr lang="pl-PL" dirty="0" smtClean="0"/>
-              <a:t>Konfiguracja</a:t>
+              <a:t>2b. Uruchomienie - </a:t>
+            </a:r>
+            <a:r>
+              <a:rPr lang="pl-PL" dirty="0"/>
+              <a:t>W</a:t>
+            </a:r>
+            <a:r>
+              <a:rPr lang="pl-PL" dirty="0" smtClean="0"/>
+              <a:t>orkbench</a:t>
             </a:r>
             <a:endParaRPr lang="pl-PL" dirty="0"/>
           </a:p>
         </p:txBody>
       </p:sp>
-      <p:sp>
-        <p:nvSpPr>
-          <p:cNvPr id="3" name="Symbol zastępczy zawartości 2"/>
-          <p:cNvSpPr>
-            <a:spLocks noGrp="1"/>
-          </p:cNvSpPr>
-          <p:nvPr>
-            <p:ph idx="1"/>
-          </p:nvPr>
-        </p:nvSpPr>
-        <p:spPr/>
-        <p:txBody>
-          <a:bodyPr/>
-          <a:lstStyle/>
-          <a:p>
-            <a:endParaRPr lang="pl-PL"/>
-          </a:p>
-        </p:txBody>
-      </p:sp>
+      <p:pic>
+        <p:nvPicPr>
+          <p:cNvPr id="2051" name="Picture 3"/>
+          <p:cNvPicPr>
+            <a:picLocks noChangeAspect="1" noChangeArrowheads="1"/>
+          </p:cNvPicPr>
+          <p:nvPr/>
+        </p:nvPicPr>
+        <p:blipFill>
+          <a:blip r:embed="rId2">
+            <a:extLst>
+              <a:ext uri="{28A0092B-C50C-407E-A947-70E740481C1C}">
+                <a14:useLocalDpi xmlns:a14="http://schemas.microsoft.com/office/drawing/2010/main" val="0"/>
+              </a:ext>
+            </a:extLst>
+          </a:blip>
+          <a:srcRect/>
+          <a:stretch>
+            <a:fillRect/>
+          </a:stretch>
+        </p:blipFill>
+        <p:spPr bwMode="auto">
+          <a:xfrm>
+            <a:off x="0" y="1413944"/>
+            <a:ext cx="9144000" cy="4924568"/>
+          </a:xfrm>
+          <a:prstGeom prst="rect">
+            <a:avLst/>
+          </a:prstGeom>
+          <a:noFill/>
+          <a:ln>
+            <a:noFill/>
+          </a:ln>
+          <a:effectLst/>
+          <a:extLst>
+            <a:ext uri="{909E8E84-426E-40DD-AFC4-6F175D3DCCD1}">
+              <a14:hiddenFill xmlns:a14="http://schemas.microsoft.com/office/drawing/2010/main">
+                <a:solidFill>
+                  <a:schemeClr val="accent1"/>
+                </a:solidFill>
+              </a14:hiddenFill>
+            </a:ext>
+            <a:ext uri="{91240B29-F687-4F45-9708-019B960494DF}">
+              <a14:hiddenLine xmlns:a14="http://schemas.microsoft.com/office/drawing/2010/main" w="9525">
+                <a:solidFill>
+                  <a:schemeClr val="tx1"/>
+                </a:solidFill>
+                <a:miter lim="800000"/>
+                <a:headEnd/>
+                <a:tailEnd/>
+              </a14:hiddenLine>
+            </a:ext>
+            <a:ext uri="{AF507438-7753-43E0-B8FC-AC1667EBCBE1}">
+              <a14:hiddenEffects xmlns:a14="http://schemas.microsoft.com/office/drawing/2010/main">
+                <a:effectLst>
+                  <a:outerShdw dist="35921" dir="2700000" algn="ctr" rotWithShape="0">
+                    <a:schemeClr val="bg2"/>
+                  </a:outerShdw>
+                </a:effectLst>
+              </a14:hiddenEffects>
+            </a:ext>
+          </a:extLst>
+        </p:spPr>
+      </p:pic>
     </p:spTree>
     <p:extLst>
       <p:ext uri="{BB962C8B-B14F-4D97-AF65-F5344CB8AC3E}">
-        <p14:creationId xmlns:p14="http://schemas.microsoft.com/office/powerpoint/2010/main" val="1586296365"/>
+        <p14:creationId xmlns:p14="http://schemas.microsoft.com/office/powerpoint/2010/main" val="935810797"/>
       </p:ext>
     </p:extLst>
   </p:cSld>
   <p:clrMapOvr>
     <a:masterClrMapping/>
   </p:clrMapOvr>
+  <p:timing>
+    <p:tnLst>
+      <p:par>
+        <p:cTn id="1" dur="indefinite" restart="never" nodeType="tmRoot"/>
+      </p:par>
+    </p:tnLst>
+  </p:timing>
 </p:sld>
 </file>
 

</xml_diff>